<commit_message>
Base code and update design.ppt
</commit_message>
<xml_diff>
--- a/doc/Design.pptx
+++ b/doc/Design.pptx
@@ -304,7 +304,7 @@
           <a:p>
             <a:fld id="{FB30EDBD-1C2D-4C1E-B459-B60219FAB484}" type="datetimeFigureOut">
               <a:rPr lang="ko-KR" altLang="en-US" smtClean="0"/>
-              <a:t>2016-06-07</a:t>
+              <a:t>2016-06-14</a:t>
             </a:fld>
             <a:endParaRPr lang="ko-KR" altLang="en-US"/>
           </a:p>
@@ -467,7 +467,7 @@
           <a:p>
             <a:fld id="{FB30EDBD-1C2D-4C1E-B459-B60219FAB484}" type="datetimeFigureOut">
               <a:rPr lang="ko-KR" altLang="en-US" smtClean="0"/>
-              <a:t>2016-06-07</a:t>
+              <a:t>2016-06-14</a:t>
             </a:fld>
             <a:endParaRPr lang="ko-KR" altLang="en-US"/>
           </a:p>
@@ -640,7 +640,7 @@
           <a:p>
             <a:fld id="{FB30EDBD-1C2D-4C1E-B459-B60219FAB484}" type="datetimeFigureOut">
               <a:rPr lang="ko-KR" altLang="en-US" smtClean="0"/>
-              <a:t>2016-06-07</a:t>
+              <a:t>2016-06-14</a:t>
             </a:fld>
             <a:endParaRPr lang="ko-KR" altLang="en-US"/>
           </a:p>
@@ -803,7 +803,7 @@
           <a:p>
             <a:fld id="{FB30EDBD-1C2D-4C1E-B459-B60219FAB484}" type="datetimeFigureOut">
               <a:rPr lang="ko-KR" altLang="en-US" smtClean="0"/>
-              <a:t>2016-06-07</a:t>
+              <a:t>2016-06-14</a:t>
             </a:fld>
             <a:endParaRPr lang="ko-KR" altLang="en-US"/>
           </a:p>
@@ -1043,7 +1043,7 @@
           <a:p>
             <a:fld id="{FB30EDBD-1C2D-4C1E-B459-B60219FAB484}" type="datetimeFigureOut">
               <a:rPr lang="ko-KR" altLang="en-US" smtClean="0"/>
-              <a:t>2016-06-07</a:t>
+              <a:t>2016-06-14</a:t>
             </a:fld>
             <a:endParaRPr lang="ko-KR" altLang="en-US"/>
           </a:p>
@@ -1323,7 +1323,7 @@
           <a:p>
             <a:fld id="{FB30EDBD-1C2D-4C1E-B459-B60219FAB484}" type="datetimeFigureOut">
               <a:rPr lang="ko-KR" altLang="en-US" smtClean="0"/>
-              <a:t>2016-06-07</a:t>
+              <a:t>2016-06-14</a:t>
             </a:fld>
             <a:endParaRPr lang="ko-KR" altLang="en-US"/>
           </a:p>
@@ -1737,7 +1737,7 @@
           <a:p>
             <a:fld id="{FB30EDBD-1C2D-4C1E-B459-B60219FAB484}" type="datetimeFigureOut">
               <a:rPr lang="ko-KR" altLang="en-US" smtClean="0"/>
-              <a:t>2016-06-07</a:t>
+              <a:t>2016-06-14</a:t>
             </a:fld>
             <a:endParaRPr lang="ko-KR" altLang="en-US"/>
           </a:p>
@@ -1849,7 +1849,7 @@
           <a:p>
             <a:fld id="{FB30EDBD-1C2D-4C1E-B459-B60219FAB484}" type="datetimeFigureOut">
               <a:rPr lang="ko-KR" altLang="en-US" smtClean="0"/>
-              <a:t>2016-06-07</a:t>
+              <a:t>2016-06-14</a:t>
             </a:fld>
             <a:endParaRPr lang="ko-KR" altLang="en-US"/>
           </a:p>
@@ -1939,7 +1939,7 @@
           <a:p>
             <a:fld id="{FB30EDBD-1C2D-4C1E-B459-B60219FAB484}" type="datetimeFigureOut">
               <a:rPr lang="ko-KR" altLang="en-US" smtClean="0"/>
-              <a:t>2016-06-07</a:t>
+              <a:t>2016-06-14</a:t>
             </a:fld>
             <a:endParaRPr lang="ko-KR" altLang="en-US"/>
           </a:p>
@@ -2209,7 +2209,7 @@
           <a:p>
             <a:fld id="{FB30EDBD-1C2D-4C1E-B459-B60219FAB484}" type="datetimeFigureOut">
               <a:rPr lang="ko-KR" altLang="en-US" smtClean="0"/>
-              <a:t>2016-06-07</a:t>
+              <a:t>2016-06-14</a:t>
             </a:fld>
             <a:endParaRPr lang="ko-KR" altLang="en-US"/>
           </a:p>
@@ -2456,7 +2456,7 @@
           <a:p>
             <a:fld id="{FB30EDBD-1C2D-4C1E-B459-B60219FAB484}" type="datetimeFigureOut">
               <a:rPr lang="ko-KR" altLang="en-US" smtClean="0"/>
-              <a:t>2016-06-07</a:t>
+              <a:t>2016-06-14</a:t>
             </a:fld>
             <a:endParaRPr lang="ko-KR" altLang="en-US"/>
           </a:p>
@@ -2662,7 +2662,7 @@
           <a:p>
             <a:fld id="{FB30EDBD-1C2D-4C1E-B459-B60219FAB484}" type="datetimeFigureOut">
               <a:rPr lang="ko-KR" altLang="en-US" smtClean="0"/>
-              <a:t>2016-06-07</a:t>
+              <a:t>2016-06-14</a:t>
             </a:fld>
             <a:endParaRPr lang="ko-KR" altLang="en-US"/>
           </a:p>
@@ -3892,15 +3892,7 @@
             </a:r>
             <a:r>
               <a:rPr lang="en-US" sz="1000" dirty="0"/>
-              <a:t>, </a:t>
-            </a:r>
-            <a:r>
-              <a:rPr lang="en-US" sz="1000" dirty="0" err="1"/>
-              <a:t>ArrayList</a:t>
-            </a:r>
-            <a:r>
-              <a:rPr lang="en-US" sz="1000" dirty="0"/>
-              <a:t> </a:t>
+              <a:t>, ArrayList </a:t>
             </a:r>
             <a:r>
               <a:rPr lang="en-US" sz="1000" dirty="0" err="1"/>
@@ -4345,15 +4337,7 @@
             <a:pPr algn="ctr"/>
             <a:r>
               <a:rPr lang="en-US" sz="1000" dirty="0"/>
-              <a:t>Return </a:t>
-            </a:r>
-            <a:r>
-              <a:rPr lang="en-US" sz="1000" dirty="0" err="1"/>
-              <a:t>ArrayList</a:t>
-            </a:r>
-            <a:r>
-              <a:rPr lang="en-US" sz="1000" dirty="0"/>
-              <a:t> of row IDs</a:t>
+              <a:t>Return ArrayList of row IDs</a:t>
             </a:r>
           </a:p>
         </p:txBody>
@@ -4437,7 +4421,7 @@
         <p:spPr>
           <a:xfrm>
             <a:off x="6948264" y="596666"/>
-            <a:ext cx="2034245" cy="938132"/>
+            <a:ext cx="2034245" cy="802185"/>
           </a:xfrm>
           <a:prstGeom prst="rect">
             <a:avLst/>
@@ -4507,8 +4491,8 @@
         </p:nvSpPr>
         <p:spPr>
           <a:xfrm>
-            <a:off x="6948264" y="596425"/>
-            <a:ext cx="2114865" cy="1015663"/>
+            <a:off x="6948264" y="674593"/>
+            <a:ext cx="2114865" cy="646331"/>
           </a:xfrm>
           <a:prstGeom prst="rect">
             <a:avLst/>
@@ -4534,32 +4518,17 @@
           </a:p>
           <a:p>
             <a:pPr algn="ctr"/>
-            <a:endParaRPr lang="en-US" sz="1200" dirty="0"/>
+            <a:r>
+              <a:rPr lang="en-US" sz="1200" dirty="0"/>
+              <a:t>ArrayList&lt;Field&gt; alField</a:t>
+            </a:r>
           </a:p>
           <a:p>
             <a:pPr algn="ctr"/>
             <a:r>
-              <a:rPr lang="en-US" sz="1200" dirty="0" err="1"/>
-              <a:t>ArrayList</a:t>
-            </a:r>
-            <a:r>
               <a:rPr lang="en-US" sz="1200" dirty="0"/>
-              <a:t> datatype</a:t>
-            </a:r>
-          </a:p>
-          <a:p>
-            <a:pPr algn="ctr"/>
-            <a:r>
-              <a:rPr lang="en-US" sz="1200" dirty="0" err="1"/>
-              <a:t>ArrayList</a:t>
-            </a:r>
-            <a:r>
-              <a:rPr lang="en-US" sz="1200" dirty="0"/>
-              <a:t>&lt;Record&gt; table</a:t>
-            </a:r>
-          </a:p>
-          <a:p>
-            <a:pPr algn="ctr"/>
+              <a:t>ArrayList&lt;Record&gt; alTable</a:t>
+            </a:r>
             <a:endParaRPr lang="en-US" sz="1200" dirty="0">
               <a:solidFill>
                 <a:prstClr val="black"/>
@@ -4576,8 +4545,8 @@
         </p:nvSpPr>
         <p:spPr>
           <a:xfrm>
-            <a:off x="4283968" y="599263"/>
-            <a:ext cx="2484271" cy="597489"/>
+            <a:off x="4932040" y="599263"/>
+            <a:ext cx="1908207" cy="597489"/>
           </a:xfrm>
           <a:prstGeom prst="rect">
             <a:avLst/>
@@ -4617,7 +4586,7 @@
         </p:nvSpPr>
         <p:spPr>
           <a:xfrm>
-            <a:off x="4770279" y="256738"/>
+            <a:off x="5220072" y="256738"/>
             <a:ext cx="1385897" cy="307777"/>
           </a:xfrm>
           <a:prstGeom prst="rect">
@@ -4647,8 +4616,8 @@
         </p:nvSpPr>
         <p:spPr>
           <a:xfrm>
-            <a:off x="4238594" y="735087"/>
-            <a:ext cx="2592288" cy="461665"/>
+            <a:off x="4932040" y="759508"/>
+            <a:ext cx="1917582" cy="276999"/>
           </a:xfrm>
           <a:prstGeom prst="rect">
             <a:avLst/>
@@ -4668,13 +4637,141 @@
             </a:r>
             <a:r>
               <a:rPr lang="en-US" sz="1200" dirty="0"/>
-              <a:t>&lt;T extends Comparable&gt; record</a:t>
+              <a:t>&lt;Value&gt; record</a:t>
             </a:r>
             <a:endParaRPr lang="en-US" sz="1200" dirty="0">
               <a:solidFill>
                 <a:prstClr val="black"/>
               </a:solidFill>
             </a:endParaRPr>
+          </a:p>
+        </p:txBody>
+      </p:sp>
+      <p:sp>
+        <p:nvSpPr>
+          <p:cNvPr id="38" name="직사각형 37"/>
+          <p:cNvSpPr/>
+          <p:nvPr/>
+        </p:nvSpPr>
+        <p:spPr>
+          <a:xfrm>
+            <a:off x="2915816" y="603173"/>
+            <a:ext cx="1908207" cy="597489"/>
+          </a:xfrm>
+          <a:prstGeom prst="rect">
+            <a:avLst/>
+          </a:prstGeom>
+          <a:noFill/>
+        </p:spPr>
+        <p:style>
+          <a:lnRef idx="2">
+            <a:schemeClr val="accent1">
+              <a:shade val="50000"/>
+            </a:schemeClr>
+          </a:lnRef>
+          <a:fillRef idx="1">
+            <a:schemeClr val="accent1"/>
+          </a:fillRef>
+          <a:effectRef idx="0">
+            <a:schemeClr val="accent1"/>
+          </a:effectRef>
+          <a:fontRef idx="minor">
+            <a:schemeClr val="lt1"/>
+          </a:fontRef>
+        </p:style>
+        <p:txBody>
+          <a:bodyPr rtlCol="0" anchor="ctr"/>
+          <a:lstStyle/>
+          <a:p>
+            <a:pPr algn="ctr"/>
+            <a:endParaRPr lang="en-US"/>
+          </a:p>
+        </p:txBody>
+      </p:sp>
+      <p:sp>
+        <p:nvSpPr>
+          <p:cNvPr id="39" name="TextBox 38"/>
+          <p:cNvSpPr txBox="1"/>
+          <p:nvPr/>
+        </p:nvSpPr>
+        <p:spPr>
+          <a:xfrm>
+            <a:off x="3203848" y="260648"/>
+            <a:ext cx="1385897" cy="307777"/>
+          </a:xfrm>
+          <a:prstGeom prst="rect">
+            <a:avLst/>
+          </a:prstGeom>
+          <a:noFill/>
+        </p:spPr>
+        <p:txBody>
+          <a:bodyPr wrap="square" rtlCol="0">
+            <a:spAutoFit/>
+          </a:bodyPr>
+          <a:lstStyle/>
+          <a:p>
+            <a:pPr algn="ctr"/>
+            <a:r>
+              <a:rPr lang="en-US" sz="1400" dirty="0"/>
+              <a:t>Value.java</a:t>
+            </a:r>
+          </a:p>
+        </p:txBody>
+      </p:sp>
+      <p:sp>
+        <p:nvSpPr>
+          <p:cNvPr id="42" name="TextBox 41"/>
+          <p:cNvSpPr txBox="1"/>
+          <p:nvPr/>
+        </p:nvSpPr>
+        <p:spPr>
+          <a:xfrm>
+            <a:off x="2915816" y="620688"/>
+            <a:ext cx="1917582" cy="584775"/>
+          </a:xfrm>
+          <a:prstGeom prst="rect">
+            <a:avLst/>
+          </a:prstGeom>
+          <a:noFill/>
+        </p:spPr>
+        <p:txBody>
+          <a:bodyPr wrap="square" rtlCol="0">
+            <a:spAutoFit/>
+          </a:bodyPr>
+          <a:lstStyle/>
+          <a:p>
+            <a:pPr algn="ctr"/>
+            <a:r>
+              <a:rPr lang="en-US" sz="1200" dirty="0"/>
+              <a:t>Field </a:t>
+            </a:r>
+            <a:r>
+              <a:rPr lang="en-US" sz="1200" dirty="0" err="1"/>
+              <a:t>field</a:t>
+            </a:r>
+            <a:endParaRPr lang="en-US" sz="1200" dirty="0"/>
+          </a:p>
+          <a:p>
+            <a:pPr algn="ctr"/>
+            <a:r>
+              <a:rPr lang="en-US" sz="1200" dirty="0">
+                <a:solidFill>
+                  <a:prstClr val="black"/>
+                </a:solidFill>
+              </a:rPr>
+              <a:t>T data</a:t>
+            </a:r>
+          </a:p>
+          <a:p>
+            <a:pPr algn="ctr"/>
+            <a:r>
+              <a:rPr lang="en-US" sz="800" dirty="0">
+                <a:solidFill>
+                  <a:prstClr val="black"/>
+                </a:solidFill>
+              </a:rPr>
+              <a:t>&lt;T extends Comparable&lt;T&gt;&gt;</a:t>
+            </a:r>
           </a:p>
         </p:txBody>
       </p:sp>
@@ -5712,6 +5809,258 @@
           </a:p>
         </p:txBody>
       </p:sp>
+      <p:cxnSp>
+        <p:nvCxnSpPr>
+          <p:cNvPr id="3" name="직선 연결선 2"/>
+          <p:cNvCxnSpPr/>
+          <p:nvPr/>
+        </p:nvCxnSpPr>
+        <p:spPr>
+          <a:xfrm>
+            <a:off x="827584" y="836712"/>
+            <a:ext cx="7632848" cy="0"/>
+          </a:xfrm>
+          <a:prstGeom prst="line">
+            <a:avLst/>
+          </a:prstGeom>
+          <a:ln>
+            <a:headEnd type="arrow"/>
+            <a:tailEnd type="arrow"/>
+          </a:ln>
+        </p:spPr>
+        <p:style>
+          <a:lnRef idx="1">
+            <a:schemeClr val="accent1"/>
+          </a:lnRef>
+          <a:fillRef idx="0">
+            <a:schemeClr val="accent1"/>
+          </a:fillRef>
+          <a:effectRef idx="0">
+            <a:schemeClr val="accent1"/>
+          </a:effectRef>
+          <a:fontRef idx="minor">
+            <a:schemeClr val="tx1"/>
+          </a:fontRef>
+        </p:style>
+      </p:cxnSp>
+      <p:sp>
+        <p:nvSpPr>
+          <p:cNvPr id="5" name="TextBox 4"/>
+          <p:cNvSpPr txBox="1"/>
+          <p:nvPr/>
+        </p:nvSpPr>
+        <p:spPr>
+          <a:xfrm>
+            <a:off x="4499992" y="457310"/>
+            <a:ext cx="1008112" cy="369332"/>
+          </a:xfrm>
+          <a:prstGeom prst="rect">
+            <a:avLst/>
+          </a:prstGeom>
+          <a:noFill/>
+        </p:spPr>
+        <p:txBody>
+          <a:bodyPr wrap="square" rtlCol="0">
+            <a:spAutoFit/>
+          </a:bodyPr>
+          <a:lstStyle/>
+          <a:p>
+            <a:r>
+              <a:rPr lang="en-US" dirty="0"/>
+              <a:t>1280</a:t>
+            </a:r>
+          </a:p>
+        </p:txBody>
+      </p:sp>
+      <p:cxnSp>
+        <p:nvCxnSpPr>
+          <p:cNvPr id="9" name="직선 화살표 연결선 8"/>
+          <p:cNvCxnSpPr/>
+          <p:nvPr/>
+        </p:nvCxnSpPr>
+        <p:spPr>
+          <a:xfrm flipH="1">
+            <a:off x="665812" y="908720"/>
+            <a:ext cx="2349" cy="5472608"/>
+          </a:xfrm>
+          <a:prstGeom prst="straightConnector1">
+            <a:avLst/>
+          </a:prstGeom>
+          <a:ln>
+            <a:headEnd type="triangle"/>
+            <a:tailEnd type="triangle"/>
+          </a:ln>
+        </p:spPr>
+        <p:style>
+          <a:lnRef idx="1">
+            <a:schemeClr val="accent1"/>
+          </a:lnRef>
+          <a:fillRef idx="0">
+            <a:schemeClr val="accent1"/>
+          </a:fillRef>
+          <a:effectRef idx="0">
+            <a:schemeClr val="accent1"/>
+          </a:effectRef>
+          <a:fontRef idx="minor">
+            <a:schemeClr val="tx1"/>
+          </a:fontRef>
+        </p:style>
+      </p:cxnSp>
+      <p:sp>
+        <p:nvSpPr>
+          <p:cNvPr id="37" name="TextBox 36"/>
+          <p:cNvSpPr txBox="1"/>
+          <p:nvPr/>
+        </p:nvSpPr>
+        <p:spPr>
+          <a:xfrm>
+            <a:off x="179512" y="3211859"/>
+            <a:ext cx="1008112" cy="369332"/>
+          </a:xfrm>
+          <a:prstGeom prst="rect">
+            <a:avLst/>
+          </a:prstGeom>
+          <a:noFill/>
+        </p:spPr>
+        <p:txBody>
+          <a:bodyPr wrap="square" rtlCol="0">
+            <a:spAutoFit/>
+          </a:bodyPr>
+          <a:lstStyle/>
+          <a:p>
+            <a:r>
+              <a:rPr lang="en-US" dirty="0"/>
+              <a:t>768</a:t>
+            </a:r>
+          </a:p>
+        </p:txBody>
+      </p:sp>
+      <p:sp>
+        <p:nvSpPr>
+          <p:cNvPr id="38" name="TextBox 37"/>
+          <p:cNvSpPr txBox="1"/>
+          <p:nvPr/>
+        </p:nvSpPr>
+        <p:spPr>
+          <a:xfrm>
+            <a:off x="292654" y="986921"/>
+            <a:ext cx="1008112" cy="369332"/>
+          </a:xfrm>
+          <a:prstGeom prst="rect">
+            <a:avLst/>
+          </a:prstGeom>
+          <a:noFill/>
+        </p:spPr>
+        <p:txBody>
+          <a:bodyPr wrap="square" rtlCol="0">
+            <a:spAutoFit/>
+          </a:bodyPr>
+          <a:lstStyle/>
+          <a:p>
+            <a:r>
+              <a:rPr lang="en-US" dirty="0"/>
+              <a:t>80</a:t>
+            </a:r>
+          </a:p>
+        </p:txBody>
+      </p:sp>
+      <p:cxnSp>
+        <p:nvCxnSpPr>
+          <p:cNvPr id="24" name="직선 화살표 연결선 23"/>
+          <p:cNvCxnSpPr/>
+          <p:nvPr/>
+        </p:nvCxnSpPr>
+        <p:spPr>
+          <a:xfrm>
+            <a:off x="755576" y="917598"/>
+            <a:ext cx="0" cy="436694"/>
+          </a:xfrm>
+          <a:prstGeom prst="straightConnector1">
+            <a:avLst/>
+          </a:prstGeom>
+          <a:ln>
+            <a:headEnd type="triangle"/>
+            <a:tailEnd type="triangle"/>
+          </a:ln>
+        </p:spPr>
+        <p:style>
+          <a:lnRef idx="1">
+            <a:schemeClr val="accent1"/>
+          </a:lnRef>
+          <a:fillRef idx="0">
+            <a:schemeClr val="accent1"/>
+          </a:fillRef>
+          <a:effectRef idx="0">
+            <a:schemeClr val="accent1"/>
+          </a:effectRef>
+          <a:fontRef idx="minor">
+            <a:schemeClr val="tx1"/>
+          </a:fontRef>
+        </p:style>
+      </p:cxnSp>
+      <p:cxnSp>
+        <p:nvCxnSpPr>
+          <p:cNvPr id="39" name="직선 연결선 38"/>
+          <p:cNvCxnSpPr/>
+          <p:nvPr/>
+        </p:nvCxnSpPr>
+        <p:spPr>
+          <a:xfrm>
+            <a:off x="827584" y="738070"/>
+            <a:ext cx="1800200" cy="0"/>
+          </a:xfrm>
+          <a:prstGeom prst="line">
+            <a:avLst/>
+          </a:prstGeom>
+          <a:ln>
+            <a:headEnd type="arrow"/>
+            <a:tailEnd type="arrow"/>
+          </a:ln>
+        </p:spPr>
+        <p:style>
+          <a:lnRef idx="1">
+            <a:schemeClr val="accent1"/>
+          </a:lnRef>
+          <a:fillRef idx="0">
+            <a:schemeClr val="accent1"/>
+          </a:fillRef>
+          <a:effectRef idx="0">
+            <a:schemeClr val="accent1"/>
+          </a:effectRef>
+          <a:fontRef idx="minor">
+            <a:schemeClr val="tx1"/>
+          </a:fontRef>
+        </p:style>
+      </p:cxnSp>
+      <p:sp>
+        <p:nvSpPr>
+          <p:cNvPr id="41" name="TextBox 40"/>
+          <p:cNvSpPr txBox="1"/>
+          <p:nvPr/>
+        </p:nvSpPr>
+        <p:spPr>
+          <a:xfrm>
+            <a:off x="1619672" y="422006"/>
+            <a:ext cx="1008112" cy="369332"/>
+          </a:xfrm>
+          <a:prstGeom prst="rect">
+            <a:avLst/>
+          </a:prstGeom>
+          <a:noFill/>
+        </p:spPr>
+        <p:txBody>
+          <a:bodyPr wrap="square" rtlCol="0">
+            <a:spAutoFit/>
+          </a:bodyPr>
+          <a:lstStyle/>
+          <a:p>
+            <a:r>
+              <a:rPr lang="en-US" dirty="0"/>
+              <a:t>300</a:t>
+            </a:r>
+          </a:p>
+        </p:txBody>
+      </p:sp>
     </p:spTree>
     <p:extLst>
       <p:ext uri="{BB962C8B-B14F-4D97-AF65-F5344CB8AC3E}">
@@ -5750,8 +6099,8 @@
         </p:nvSpPr>
         <p:spPr>
           <a:xfrm>
-            <a:off x="180015" y="598408"/>
-            <a:ext cx="2088232" cy="369332"/>
+            <a:off x="324030" y="2400548"/>
+            <a:ext cx="6508299" cy="369332"/>
           </a:xfrm>
           <a:prstGeom prst="rect">
             <a:avLst/>
@@ -5765,12 +6114,19 @@
           <a:lstStyle/>
           <a:p>
             <a:r>
-              <a:rPr lang="en-US" b="1" dirty="0" err="1"/>
-              <a:t>ArrayList</a:t>
-            </a:r>
-            <a:r>
               <a:rPr lang="en-US" b="1" dirty="0"/>
-              <a:t> records</a:t>
+              <a:t>Table.java : </a:t>
+            </a:r>
+            <a:r>
+              <a:rPr lang="en-US" b="1" dirty="0">
+                <a:solidFill>
+                  <a:schemeClr val="tx2">
+                    <a:lumMod val="60000"/>
+                    <a:lumOff val="40000"/>
+                  </a:schemeClr>
+                </a:solidFill>
+              </a:rPr>
+              <a:t>ArrayList&lt;Record&gt; alTable</a:t>
             </a:r>
           </a:p>
         </p:txBody>
@@ -5784,13 +6140,13 @@
           <p:nvPr>
             <p:extLst>
               <p:ext uri="{D42A27DB-BD31-4B8C-83A1-F6EECF244321}">
-                <p14:modId xmlns:p14="http://schemas.microsoft.com/office/powerpoint/2010/main" val="3720084548"/>
+                <p14:modId xmlns:p14="http://schemas.microsoft.com/office/powerpoint/2010/main" val="4127132568"/>
               </p:ext>
             </p:extLst>
           </p:nvPr>
         </p:nvGraphicFramePr>
         <p:xfrm>
-          <a:off x="1097860" y="1128395"/>
+          <a:off x="1241876" y="2845539"/>
           <a:ext cx="6380872" cy="432048"/>
         </p:xfrm>
         <a:graphic>
@@ -5865,12 +6221,193 @@
                     <a:p>
                       <a:pPr algn="ctr"/>
                       <a:r>
-                        <a:rPr lang="en-US" sz="1400" dirty="0">
+                        <a:rPr lang="en-US" sz="1000" dirty="0">
                           <a:solidFill>
                             <a:schemeClr val="tx1"/>
                           </a:solidFill>
                         </a:rPr>
-                        <a:t>Field1</a:t>
+                        <a:t>Value </a:t>
+                      </a:r>
+                    </a:p>
+                    <a:p>
+                      <a:pPr algn="ctr"/>
+                      <a:r>
+                        <a:rPr lang="en-US" sz="1000" dirty="0">
+                          <a:solidFill>
+                            <a:schemeClr val="tx1"/>
+                          </a:solidFill>
+                        </a:rPr>
+                        <a:t>Obj1</a:t>
+                      </a:r>
+                    </a:p>
+                  </a:txBody>
+                  <a:tcPr anchor="ctr">
+                    <a:solidFill>
+                      <a:schemeClr val="bg1">
+                        <a:lumMod val="95000"/>
+                      </a:schemeClr>
+                    </a:solidFill>
+                  </a:tcPr>
+                </a:tc>
+                <a:tc>
+                  <a:txBody>
+                    <a:bodyPr/>
+                    <a:lstStyle/>
+                    <a:p>
+                      <a:pPr marL="0" marR="0" lvl="0" indent="0" algn="ctr" defTabSz="914400" rtl="0" eaLnBrk="1" fontAlgn="auto" latinLnBrk="1" hangingPunct="1">
+                        <a:lnSpc>
+                          <a:spcPct val="100000"/>
+                        </a:lnSpc>
+                        <a:spcBef>
+                          <a:spcPts val="0"/>
+                        </a:spcBef>
+                        <a:spcAft>
+                          <a:spcPts val="0"/>
+                        </a:spcAft>
+                        <a:buClrTx/>
+                        <a:buSzTx/>
+                        <a:buFontTx/>
+                        <a:buNone/>
+                        <a:tabLst/>
+                        <a:defRPr/>
+                      </a:pPr>
+                      <a:r>
+                        <a:rPr kumimoji="0" lang="en-US" sz="1000" b="1" i="0" u="none" strike="noStrike" kern="1200" cap="none" spc="0" normalizeH="0" baseline="0" noProof="0" dirty="0">
+                          <a:ln>
+                            <a:noFill/>
+                          </a:ln>
+                          <a:solidFill>
+                            <a:prstClr val="black"/>
+                          </a:solidFill>
+                          <a:effectLst/>
+                          <a:uLnTx/>
+                          <a:uFillTx/>
+                          <a:latin typeface="+mn-lt"/>
+                          <a:ea typeface="+mn-ea"/>
+                          <a:cs typeface="+mn-cs"/>
+                        </a:rPr>
+                        <a:t>Value </a:t>
+                      </a:r>
+                    </a:p>
+                    <a:p>
+                      <a:pPr marL="0" marR="0" lvl="0" indent="0" algn="ctr" defTabSz="914400" rtl="0" eaLnBrk="1" fontAlgn="auto" latinLnBrk="1" hangingPunct="1">
+                        <a:lnSpc>
+                          <a:spcPct val="100000"/>
+                        </a:lnSpc>
+                        <a:spcBef>
+                          <a:spcPts val="0"/>
+                        </a:spcBef>
+                        <a:spcAft>
+                          <a:spcPts val="0"/>
+                        </a:spcAft>
+                        <a:buClrTx/>
+                        <a:buSzTx/>
+                        <a:buFontTx/>
+                        <a:buNone/>
+                        <a:tabLst/>
+                        <a:defRPr/>
+                      </a:pPr>
+                      <a:r>
+                        <a:rPr kumimoji="0" lang="en-US" sz="1000" b="1" i="0" u="none" strike="noStrike" kern="1200" cap="none" spc="0" normalizeH="0" baseline="0" noProof="0" dirty="0">
+                          <a:ln>
+                            <a:noFill/>
+                          </a:ln>
+                          <a:solidFill>
+                            <a:prstClr val="black"/>
+                          </a:solidFill>
+                          <a:effectLst/>
+                          <a:uLnTx/>
+                          <a:uFillTx/>
+                          <a:latin typeface="+mn-lt"/>
+                          <a:ea typeface="+mn-ea"/>
+                          <a:cs typeface="+mn-cs"/>
+                        </a:rPr>
+                        <a:t>Obj2</a:t>
+                      </a:r>
+                    </a:p>
+                  </a:txBody>
+                  <a:tcPr anchor="ctr">
+                    <a:solidFill>
+                      <a:schemeClr val="bg1">
+                        <a:lumMod val="95000"/>
+                      </a:schemeClr>
+                    </a:solidFill>
+                  </a:tcPr>
+                </a:tc>
+                <a:tc>
+                  <a:txBody>
+                    <a:bodyPr/>
+                    <a:lstStyle/>
+                    <a:p>
+                      <a:pPr marL="0" marR="0" lvl="0" indent="0" algn="ctr" defTabSz="914400" rtl="0" eaLnBrk="1" fontAlgn="auto" latinLnBrk="1" hangingPunct="1">
+                        <a:lnSpc>
+                          <a:spcPct val="100000"/>
+                        </a:lnSpc>
+                        <a:spcBef>
+                          <a:spcPts val="0"/>
+                        </a:spcBef>
+                        <a:spcAft>
+                          <a:spcPts val="0"/>
+                        </a:spcAft>
+                        <a:buClrTx/>
+                        <a:buSzTx/>
+                        <a:buFontTx/>
+                        <a:buNone/>
+                        <a:tabLst/>
+                        <a:defRPr/>
+                      </a:pPr>
+                      <a:r>
+                        <a:rPr kumimoji="0" lang="en-US" sz="1000" b="1" i="0" u="none" strike="noStrike" kern="1200" cap="none" spc="0" normalizeH="0" baseline="0" noProof="0" dirty="0">
+                          <a:ln>
+                            <a:noFill/>
+                          </a:ln>
+                          <a:solidFill>
+                            <a:prstClr val="black"/>
+                          </a:solidFill>
+                          <a:effectLst/>
+                          <a:uLnTx/>
+                          <a:uFillTx/>
+                          <a:latin typeface="+mn-lt"/>
+                          <a:ea typeface="+mn-ea"/>
+                          <a:cs typeface="+mn-cs"/>
+                        </a:rPr>
+                        <a:t>Value </a:t>
+                      </a:r>
+                    </a:p>
+                    <a:p>
+                      <a:pPr marL="0" marR="0" lvl="0" indent="0" algn="ctr" defTabSz="914400" rtl="0" eaLnBrk="1" fontAlgn="auto" latinLnBrk="1" hangingPunct="1">
+                        <a:lnSpc>
+                          <a:spcPct val="100000"/>
+                        </a:lnSpc>
+                        <a:spcBef>
+                          <a:spcPts val="0"/>
+                        </a:spcBef>
+                        <a:spcAft>
+                          <a:spcPts val="0"/>
+                        </a:spcAft>
+                        <a:buClrTx/>
+                        <a:buSzTx/>
+                        <a:buFontTx/>
+                        <a:buNone/>
+                        <a:tabLst/>
+                        <a:defRPr/>
+                      </a:pPr>
+                      <a:r>
+                        <a:rPr kumimoji="0" lang="en-US" sz="1000" b="1" i="0" u="none" strike="noStrike" kern="1200" cap="none" spc="0" normalizeH="0" baseline="0" noProof="0" dirty="0">
+                          <a:ln>
+                            <a:noFill/>
+                          </a:ln>
+                          <a:solidFill>
+                            <a:prstClr val="black"/>
+                          </a:solidFill>
+                          <a:effectLst/>
+                          <a:uLnTx/>
+                          <a:uFillTx/>
+                          <a:latin typeface="+mn-lt"/>
+                          <a:ea typeface="+mn-ea"/>
+                          <a:cs typeface="+mn-cs"/>
+                        </a:rPr>
+                        <a:t>Obj3</a:t>
                       </a:r>
                     </a:p>
                   </a:txBody>
@@ -5905,12 +6442,39 @@
                         <a:defRPr/>
                       </a:pPr>
                       <a:r>
-                        <a:rPr lang="en-US" sz="1400" dirty="0">
+                        <a:rPr lang="en-US" sz="1000" dirty="0">
                           <a:solidFill>
                             <a:schemeClr val="tx1"/>
                           </a:solidFill>
                         </a:rPr>
-                        <a:t>Field2</a:t>
+                        <a:t>Value</a:t>
+                      </a:r>
+                    </a:p>
+                    <a:p>
+                      <a:pPr marL="0" marR="0" indent="0" algn="ctr" defTabSz="914400" rtl="0" eaLnBrk="1" fontAlgn="auto" latinLnBrk="1" hangingPunct="1">
+                        <a:lnSpc>
+                          <a:spcPct val="100000"/>
+                        </a:lnSpc>
+                        <a:spcBef>
+                          <a:spcPts val="0"/>
+                        </a:spcBef>
+                        <a:spcAft>
+                          <a:spcPts val="0"/>
+                        </a:spcAft>
+                        <a:buClrTx/>
+                        <a:buSzTx/>
+                        <a:buFontTx/>
+                        <a:buNone/>
+                        <a:tabLst/>
+                        <a:defRPr/>
+                      </a:pPr>
+                      <a:r>
+                        <a:rPr lang="en-US" sz="1000" dirty="0">
+                          <a:solidFill>
+                            <a:schemeClr val="tx1"/>
+                          </a:solidFill>
+                        </a:rPr>
+                        <a:t>Obj4</a:t>
                       </a:r>
                     </a:p>
                   </a:txBody>
@@ -5945,12 +6509,39 @@
                         <a:defRPr/>
                       </a:pPr>
                       <a:r>
-                        <a:rPr lang="en-US" sz="1400" dirty="0">
+                        <a:rPr lang="en-US" sz="1000" dirty="0">
                           <a:solidFill>
                             <a:schemeClr val="tx1"/>
                           </a:solidFill>
                         </a:rPr>
-                        <a:t>Field3</a:t>
+                        <a:t>Value</a:t>
+                      </a:r>
+                    </a:p>
+                    <a:p>
+                      <a:pPr marL="0" marR="0" indent="0" algn="ctr" defTabSz="914400" rtl="0" eaLnBrk="1" fontAlgn="auto" latinLnBrk="1" hangingPunct="1">
+                        <a:lnSpc>
+                          <a:spcPct val="100000"/>
+                        </a:lnSpc>
+                        <a:spcBef>
+                          <a:spcPts val="0"/>
+                        </a:spcBef>
+                        <a:spcAft>
+                          <a:spcPts val="0"/>
+                        </a:spcAft>
+                        <a:buClrTx/>
+                        <a:buSzTx/>
+                        <a:buFontTx/>
+                        <a:buNone/>
+                        <a:tabLst/>
+                        <a:defRPr/>
+                      </a:pPr>
+                      <a:r>
+                        <a:rPr lang="en-US" sz="1000" dirty="0">
+                          <a:solidFill>
+                            <a:schemeClr val="tx1"/>
+                          </a:solidFill>
+                        </a:rPr>
+                        <a:t>Obj5</a:t>
                       </a:r>
                     </a:p>
                   </a:txBody>
@@ -5985,12 +6576,39 @@
                         <a:defRPr/>
                       </a:pPr>
                       <a:r>
-                        <a:rPr lang="en-US" sz="1400" dirty="0">
+                        <a:rPr lang="en-US" sz="1000" dirty="0">
                           <a:solidFill>
                             <a:schemeClr val="tx1"/>
                           </a:solidFill>
                         </a:rPr>
-                        <a:t>Field4</a:t>
+                        <a:t>Value</a:t>
+                      </a:r>
+                    </a:p>
+                    <a:p>
+                      <a:pPr marL="0" marR="0" indent="0" algn="ctr" defTabSz="914400" rtl="0" eaLnBrk="1" fontAlgn="auto" latinLnBrk="1" hangingPunct="1">
+                        <a:lnSpc>
+                          <a:spcPct val="100000"/>
+                        </a:lnSpc>
+                        <a:spcBef>
+                          <a:spcPts val="0"/>
+                        </a:spcBef>
+                        <a:spcAft>
+                          <a:spcPts val="0"/>
+                        </a:spcAft>
+                        <a:buClrTx/>
+                        <a:buSzTx/>
+                        <a:buFontTx/>
+                        <a:buNone/>
+                        <a:tabLst/>
+                        <a:defRPr/>
+                      </a:pPr>
+                      <a:r>
+                        <a:rPr lang="en-US" sz="1000" dirty="0">
+                          <a:solidFill>
+                            <a:schemeClr val="tx1"/>
+                          </a:solidFill>
+                        </a:rPr>
+                        <a:t>Obj6</a:t>
                       </a:r>
                     </a:p>
                   </a:txBody>
@@ -6025,12 +6643,39 @@
                         <a:defRPr/>
                       </a:pPr>
                       <a:r>
-                        <a:rPr lang="en-US" sz="1400" dirty="0">
+                        <a:rPr lang="en-US" sz="1000" dirty="0">
                           <a:solidFill>
                             <a:schemeClr val="tx1"/>
                           </a:solidFill>
                         </a:rPr>
-                        <a:t>Field5</a:t>
+                        <a:t>Value</a:t>
+                      </a:r>
+                    </a:p>
+                    <a:p>
+                      <a:pPr marL="0" marR="0" indent="0" algn="ctr" defTabSz="914400" rtl="0" eaLnBrk="1" fontAlgn="auto" latinLnBrk="1" hangingPunct="1">
+                        <a:lnSpc>
+                          <a:spcPct val="100000"/>
+                        </a:lnSpc>
+                        <a:spcBef>
+                          <a:spcPts val="0"/>
+                        </a:spcBef>
+                        <a:spcAft>
+                          <a:spcPts val="0"/>
+                        </a:spcAft>
+                        <a:buClrTx/>
+                        <a:buSzTx/>
+                        <a:buFontTx/>
+                        <a:buNone/>
+                        <a:tabLst/>
+                        <a:defRPr/>
+                      </a:pPr>
+                      <a:r>
+                        <a:rPr lang="en-US" sz="1000" dirty="0">
+                          <a:solidFill>
+                            <a:schemeClr val="tx1"/>
+                          </a:solidFill>
+                        </a:rPr>
+                        <a:t>Obj7</a:t>
                       </a:r>
                     </a:p>
                   </a:txBody>
@@ -6065,87 +6710,7 @@
                         <a:defRPr/>
                       </a:pPr>
                       <a:r>
-                        <a:rPr lang="en-US" sz="1400" dirty="0">
-                          <a:solidFill>
-                            <a:schemeClr val="tx1"/>
-                          </a:solidFill>
-                        </a:rPr>
-                        <a:t>Field6</a:t>
-                      </a:r>
-                    </a:p>
-                  </a:txBody>
-                  <a:tcPr anchor="ctr">
-                    <a:solidFill>
-                      <a:schemeClr val="bg1">
-                        <a:lumMod val="95000"/>
-                      </a:schemeClr>
-                    </a:solidFill>
-                  </a:tcPr>
-                </a:tc>
-                <a:tc>
-                  <a:txBody>
-                    <a:bodyPr/>
-                    <a:lstStyle/>
-                    <a:p>
-                      <a:pPr marL="0" marR="0" indent="0" algn="ctr" defTabSz="914400" rtl="0" eaLnBrk="1" fontAlgn="auto" latinLnBrk="1" hangingPunct="1">
-                        <a:lnSpc>
-                          <a:spcPct val="100000"/>
-                        </a:lnSpc>
-                        <a:spcBef>
-                          <a:spcPts val="0"/>
-                        </a:spcBef>
-                        <a:spcAft>
-                          <a:spcPts val="0"/>
-                        </a:spcAft>
-                        <a:buClrTx/>
-                        <a:buSzTx/>
-                        <a:buFontTx/>
-                        <a:buNone/>
-                        <a:tabLst/>
-                        <a:defRPr/>
-                      </a:pPr>
-                      <a:r>
-                        <a:rPr lang="en-US" sz="1400" dirty="0">
-                          <a:solidFill>
-                            <a:schemeClr val="tx1"/>
-                          </a:solidFill>
-                        </a:rPr>
-                        <a:t>Field7</a:t>
-                      </a:r>
-                    </a:p>
-                  </a:txBody>
-                  <a:tcPr anchor="ctr">
-                    <a:solidFill>
-                      <a:schemeClr val="bg1">
-                        <a:lumMod val="95000"/>
-                      </a:schemeClr>
-                    </a:solidFill>
-                  </a:tcPr>
-                </a:tc>
-                <a:tc>
-                  <a:txBody>
-                    <a:bodyPr/>
-                    <a:lstStyle/>
-                    <a:p>
-                      <a:pPr marL="0" marR="0" indent="0" algn="ctr" defTabSz="914400" rtl="0" eaLnBrk="1" fontAlgn="auto" latinLnBrk="1" hangingPunct="1">
-                        <a:lnSpc>
-                          <a:spcPct val="100000"/>
-                        </a:lnSpc>
-                        <a:spcBef>
-                          <a:spcPts val="0"/>
-                        </a:spcBef>
-                        <a:spcAft>
-                          <a:spcPts val="0"/>
-                        </a:spcAft>
-                        <a:buClrTx/>
-                        <a:buSzTx/>
-                        <a:buFontTx/>
-                        <a:buNone/>
-                        <a:tabLst/>
-                        <a:defRPr/>
-                      </a:pPr>
-                      <a:r>
-                        <a:rPr lang="en-US" sz="1400" dirty="0">
+                        <a:rPr lang="en-US" sz="1000" dirty="0">
                           <a:solidFill>
                             <a:schemeClr val="tx1"/>
                           </a:solidFill>
@@ -6181,13 +6746,13 @@
           <p:nvPr>
             <p:extLst>
               <p:ext uri="{D42A27DB-BD31-4B8C-83A1-F6EECF244321}">
-                <p14:modId xmlns:p14="http://schemas.microsoft.com/office/powerpoint/2010/main" val="1762194730"/>
+                <p14:modId xmlns:p14="http://schemas.microsoft.com/office/powerpoint/2010/main" val="2725368955"/>
               </p:ext>
             </p:extLst>
           </p:nvPr>
         </p:nvGraphicFramePr>
         <p:xfrm>
-          <a:off x="255451" y="1110639"/>
+          <a:off x="399467" y="2827783"/>
           <a:ext cx="792088" cy="2376265"/>
         </p:xfrm>
         <a:graphic>
@@ -6322,7 +6887,7 @@
         </p:nvSpPr>
         <p:spPr>
           <a:xfrm>
-            <a:off x="7506572" y="1162902"/>
+            <a:off x="7596336" y="2880046"/>
             <a:ext cx="1584176" cy="307777"/>
           </a:xfrm>
           <a:prstGeom prst="rect">
@@ -6337,15 +6902,33 @@
           <a:lstStyle/>
           <a:p>
             <a:r>
-              <a:rPr lang="en-US" sz="1400" b="1" dirty="0"/>
+              <a:rPr lang="en-US" sz="1400" b="1" dirty="0">
+                <a:solidFill>
+                  <a:schemeClr val="bg1">
+                    <a:lumMod val="50000"/>
+                  </a:schemeClr>
+                </a:solidFill>
+              </a:rPr>
               <a:t>Record </a:t>
             </a:r>
             <a:r>
-              <a:rPr lang="en-US" sz="1400" b="1" dirty="0" err="1"/>
+              <a:rPr lang="en-US" sz="1400" b="1" dirty="0" err="1">
+                <a:solidFill>
+                  <a:schemeClr val="bg1">
+                    <a:lumMod val="50000"/>
+                  </a:schemeClr>
+                </a:solidFill>
+              </a:rPr>
               <a:t>Obj</a:t>
             </a:r>
             <a:r>
-              <a:rPr lang="en-US" sz="1400" b="1" dirty="0"/>
+              <a:rPr lang="en-US" sz="1400" b="1" dirty="0">
+                <a:solidFill>
+                  <a:schemeClr val="bg1">
+                    <a:lumMod val="50000"/>
+                  </a:schemeClr>
+                </a:solidFill>
+              </a:rPr>
               <a:t> 1</a:t>
             </a:r>
           </a:p>
@@ -6360,13 +6943,13 @@
           <p:nvPr>
             <p:extLst>
               <p:ext uri="{D42A27DB-BD31-4B8C-83A1-F6EECF244321}">
-                <p14:modId xmlns:p14="http://schemas.microsoft.com/office/powerpoint/2010/main" val="3629457371"/>
+                <p14:modId xmlns:p14="http://schemas.microsoft.com/office/powerpoint/2010/main" val="1778267315"/>
               </p:ext>
             </p:extLst>
           </p:nvPr>
         </p:nvGraphicFramePr>
         <p:xfrm>
-          <a:off x="1097860" y="1595955"/>
+          <a:off x="1241876" y="3313099"/>
           <a:ext cx="6380872" cy="432048"/>
         </p:xfrm>
         <a:graphic>
@@ -6441,12 +7024,23 @@
                     <a:p>
                       <a:pPr algn="ctr"/>
                       <a:r>
-                        <a:rPr lang="en-US" sz="1400" dirty="0">
+                        <a:rPr lang="en-US" sz="1000" dirty="0">
                           <a:solidFill>
                             <a:schemeClr val="tx1"/>
                           </a:solidFill>
                         </a:rPr>
-                        <a:t>Field1</a:t>
+                        <a:t>Value </a:t>
+                      </a:r>
+                    </a:p>
+                    <a:p>
+                      <a:pPr algn="ctr"/>
+                      <a:r>
+                        <a:rPr lang="en-US" sz="1000" dirty="0">
+                          <a:solidFill>
+                            <a:schemeClr val="tx1"/>
+                          </a:solidFill>
+                        </a:rPr>
+                        <a:t>Obj1</a:t>
                       </a:r>
                     </a:p>
                   </a:txBody>
@@ -6481,12 +7075,39 @@
                         <a:defRPr/>
                       </a:pPr>
                       <a:r>
-                        <a:rPr lang="en-US" sz="1400" dirty="0">
+                        <a:rPr lang="en-US" sz="1000" dirty="0">
                           <a:solidFill>
                             <a:schemeClr val="tx1"/>
                           </a:solidFill>
                         </a:rPr>
-                        <a:t>Field2</a:t>
+                        <a:t>Value </a:t>
+                      </a:r>
+                    </a:p>
+                    <a:p>
+                      <a:pPr marL="0" marR="0" indent="0" algn="ctr" defTabSz="914400" rtl="0" eaLnBrk="1" fontAlgn="auto" latinLnBrk="1" hangingPunct="1">
+                        <a:lnSpc>
+                          <a:spcPct val="100000"/>
+                        </a:lnSpc>
+                        <a:spcBef>
+                          <a:spcPts val="0"/>
+                        </a:spcBef>
+                        <a:spcAft>
+                          <a:spcPts val="0"/>
+                        </a:spcAft>
+                        <a:buClrTx/>
+                        <a:buSzTx/>
+                        <a:buFontTx/>
+                        <a:buNone/>
+                        <a:tabLst/>
+                        <a:defRPr/>
+                      </a:pPr>
+                      <a:r>
+                        <a:rPr lang="en-US" sz="1000" dirty="0">
+                          <a:solidFill>
+                            <a:schemeClr val="tx1"/>
+                          </a:solidFill>
+                        </a:rPr>
+                        <a:t>Obj2</a:t>
                       </a:r>
                     </a:p>
                   </a:txBody>
@@ -6521,12 +7142,39 @@
                         <a:defRPr/>
                       </a:pPr>
                       <a:r>
-                        <a:rPr lang="en-US" sz="1400" dirty="0">
+                        <a:rPr lang="en-US" sz="1000" dirty="0">
                           <a:solidFill>
                             <a:schemeClr val="tx1"/>
                           </a:solidFill>
                         </a:rPr>
-                        <a:t>Field3</a:t>
+                        <a:t>Value </a:t>
+                      </a:r>
+                    </a:p>
+                    <a:p>
+                      <a:pPr marL="0" marR="0" indent="0" algn="ctr" defTabSz="914400" rtl="0" eaLnBrk="1" fontAlgn="auto" latinLnBrk="1" hangingPunct="1">
+                        <a:lnSpc>
+                          <a:spcPct val="100000"/>
+                        </a:lnSpc>
+                        <a:spcBef>
+                          <a:spcPts val="0"/>
+                        </a:spcBef>
+                        <a:spcAft>
+                          <a:spcPts val="0"/>
+                        </a:spcAft>
+                        <a:buClrTx/>
+                        <a:buSzTx/>
+                        <a:buFontTx/>
+                        <a:buNone/>
+                        <a:tabLst/>
+                        <a:defRPr/>
+                      </a:pPr>
+                      <a:r>
+                        <a:rPr lang="en-US" sz="1000" dirty="0">
+                          <a:solidFill>
+                            <a:schemeClr val="tx1"/>
+                          </a:solidFill>
+                        </a:rPr>
+                        <a:t>Obj3</a:t>
                       </a:r>
                     </a:p>
                   </a:txBody>
@@ -6561,12 +7209,39 @@
                         <a:defRPr/>
                       </a:pPr>
                       <a:r>
-                        <a:rPr lang="en-US" sz="1400" dirty="0">
+                        <a:rPr lang="en-US" sz="1000" dirty="0">
                           <a:solidFill>
                             <a:schemeClr val="tx1"/>
                           </a:solidFill>
                         </a:rPr>
-                        <a:t>Field4</a:t>
+                        <a:t>Value </a:t>
+                      </a:r>
+                    </a:p>
+                    <a:p>
+                      <a:pPr marL="0" marR="0" indent="0" algn="ctr" defTabSz="914400" rtl="0" eaLnBrk="1" fontAlgn="auto" latinLnBrk="1" hangingPunct="1">
+                        <a:lnSpc>
+                          <a:spcPct val="100000"/>
+                        </a:lnSpc>
+                        <a:spcBef>
+                          <a:spcPts val="0"/>
+                        </a:spcBef>
+                        <a:spcAft>
+                          <a:spcPts val="0"/>
+                        </a:spcAft>
+                        <a:buClrTx/>
+                        <a:buSzTx/>
+                        <a:buFontTx/>
+                        <a:buNone/>
+                        <a:tabLst/>
+                        <a:defRPr/>
+                      </a:pPr>
+                      <a:r>
+                        <a:rPr lang="en-US" sz="1000" dirty="0">
+                          <a:solidFill>
+                            <a:schemeClr val="tx1"/>
+                          </a:solidFill>
+                        </a:rPr>
+                        <a:t>Obj4</a:t>
                       </a:r>
                     </a:p>
                   </a:txBody>
@@ -6601,12 +7276,39 @@
                         <a:defRPr/>
                       </a:pPr>
                       <a:r>
-                        <a:rPr lang="en-US" sz="1400" dirty="0">
+                        <a:rPr lang="en-US" sz="1000" dirty="0">
                           <a:solidFill>
                             <a:schemeClr val="tx1"/>
                           </a:solidFill>
                         </a:rPr>
-                        <a:t>Field5</a:t>
+                        <a:t>Value </a:t>
+                      </a:r>
+                    </a:p>
+                    <a:p>
+                      <a:pPr marL="0" marR="0" indent="0" algn="ctr" defTabSz="914400" rtl="0" eaLnBrk="1" fontAlgn="auto" latinLnBrk="1" hangingPunct="1">
+                        <a:lnSpc>
+                          <a:spcPct val="100000"/>
+                        </a:lnSpc>
+                        <a:spcBef>
+                          <a:spcPts val="0"/>
+                        </a:spcBef>
+                        <a:spcAft>
+                          <a:spcPts val="0"/>
+                        </a:spcAft>
+                        <a:buClrTx/>
+                        <a:buSzTx/>
+                        <a:buFontTx/>
+                        <a:buNone/>
+                        <a:tabLst/>
+                        <a:defRPr/>
+                      </a:pPr>
+                      <a:r>
+                        <a:rPr lang="en-US" sz="1000" dirty="0">
+                          <a:solidFill>
+                            <a:schemeClr val="tx1"/>
+                          </a:solidFill>
+                        </a:rPr>
+                        <a:t>Obj5</a:t>
                       </a:r>
                     </a:p>
                   </a:txBody>
@@ -6641,12 +7343,39 @@
                         <a:defRPr/>
                       </a:pPr>
                       <a:r>
-                        <a:rPr lang="en-US" sz="1400" dirty="0">
+                        <a:rPr lang="en-US" sz="1000" dirty="0">
                           <a:solidFill>
                             <a:schemeClr val="tx1"/>
                           </a:solidFill>
                         </a:rPr>
-                        <a:t>Field6</a:t>
+                        <a:t>Value </a:t>
+                      </a:r>
+                    </a:p>
+                    <a:p>
+                      <a:pPr marL="0" marR="0" indent="0" algn="ctr" defTabSz="914400" rtl="0" eaLnBrk="1" fontAlgn="auto" latinLnBrk="1" hangingPunct="1">
+                        <a:lnSpc>
+                          <a:spcPct val="100000"/>
+                        </a:lnSpc>
+                        <a:spcBef>
+                          <a:spcPts val="0"/>
+                        </a:spcBef>
+                        <a:spcAft>
+                          <a:spcPts val="0"/>
+                        </a:spcAft>
+                        <a:buClrTx/>
+                        <a:buSzTx/>
+                        <a:buFontTx/>
+                        <a:buNone/>
+                        <a:tabLst/>
+                        <a:defRPr/>
+                      </a:pPr>
+                      <a:r>
+                        <a:rPr lang="en-US" sz="1000" dirty="0">
+                          <a:solidFill>
+                            <a:schemeClr val="tx1"/>
+                          </a:solidFill>
+                        </a:rPr>
+                        <a:t>Obj6</a:t>
                       </a:r>
                     </a:p>
                   </a:txBody>
@@ -6681,12 +7410,39 @@
                         <a:defRPr/>
                       </a:pPr>
                       <a:r>
-                        <a:rPr lang="en-US" sz="1400" dirty="0">
+                        <a:rPr lang="en-US" sz="1000" dirty="0">
                           <a:solidFill>
                             <a:schemeClr val="tx1"/>
                           </a:solidFill>
                         </a:rPr>
-                        <a:t>Field7</a:t>
+                        <a:t>Value </a:t>
+                      </a:r>
+                    </a:p>
+                    <a:p>
+                      <a:pPr marL="0" marR="0" indent="0" algn="ctr" defTabSz="914400" rtl="0" eaLnBrk="1" fontAlgn="auto" latinLnBrk="1" hangingPunct="1">
+                        <a:lnSpc>
+                          <a:spcPct val="100000"/>
+                        </a:lnSpc>
+                        <a:spcBef>
+                          <a:spcPts val="0"/>
+                        </a:spcBef>
+                        <a:spcAft>
+                          <a:spcPts val="0"/>
+                        </a:spcAft>
+                        <a:buClrTx/>
+                        <a:buSzTx/>
+                        <a:buFontTx/>
+                        <a:buNone/>
+                        <a:tabLst/>
+                        <a:defRPr/>
+                      </a:pPr>
+                      <a:r>
+                        <a:rPr lang="en-US" sz="1000" dirty="0">
+                          <a:solidFill>
+                            <a:schemeClr val="tx1"/>
+                          </a:solidFill>
+                        </a:rPr>
+                        <a:t>Obj7</a:t>
                       </a:r>
                     </a:p>
                   </a:txBody>
@@ -6721,7 +7477,7 @@
                         <a:defRPr/>
                       </a:pPr>
                       <a:r>
-                        <a:rPr lang="en-US" sz="1400" dirty="0">
+                        <a:rPr lang="en-US" sz="1000" dirty="0">
                           <a:solidFill>
                             <a:schemeClr val="tx1"/>
                           </a:solidFill>
@@ -6756,7 +7512,7 @@
         </p:nvSpPr>
         <p:spPr>
           <a:xfrm>
-            <a:off x="7506572" y="1630462"/>
+            <a:off x="7596336" y="3347606"/>
             <a:ext cx="1584176" cy="307777"/>
           </a:xfrm>
           <a:prstGeom prst="rect">
@@ -6771,15 +7527,33 @@
           <a:lstStyle/>
           <a:p>
             <a:r>
-              <a:rPr lang="en-US" sz="1400" b="1" dirty="0"/>
+              <a:rPr lang="en-US" sz="1400" b="1" dirty="0">
+                <a:solidFill>
+                  <a:schemeClr val="bg1">
+                    <a:lumMod val="50000"/>
+                  </a:schemeClr>
+                </a:solidFill>
+              </a:rPr>
               <a:t>Record </a:t>
             </a:r>
             <a:r>
-              <a:rPr lang="en-US" sz="1400" b="1" dirty="0" err="1"/>
+              <a:rPr lang="en-US" sz="1400" b="1" dirty="0" err="1">
+                <a:solidFill>
+                  <a:schemeClr val="bg1">
+                    <a:lumMod val="50000"/>
+                  </a:schemeClr>
+                </a:solidFill>
+              </a:rPr>
               <a:t>Obj</a:t>
             </a:r>
             <a:r>
-              <a:rPr lang="en-US" sz="1400" b="1" dirty="0"/>
+              <a:rPr lang="en-US" sz="1400" b="1" dirty="0">
+                <a:solidFill>
+                  <a:schemeClr val="bg1">
+                    <a:lumMod val="50000"/>
+                  </a:schemeClr>
+                </a:solidFill>
+              </a:rPr>
               <a:t> 2</a:t>
             </a:r>
           </a:p>
@@ -6794,13 +7568,13 @@
           <p:nvPr>
             <p:extLst>
               <p:ext uri="{D42A27DB-BD31-4B8C-83A1-F6EECF244321}">
-                <p14:modId xmlns:p14="http://schemas.microsoft.com/office/powerpoint/2010/main" val="2689696020"/>
+                <p14:modId xmlns:p14="http://schemas.microsoft.com/office/powerpoint/2010/main" val="2169926802"/>
               </p:ext>
             </p:extLst>
           </p:nvPr>
         </p:nvGraphicFramePr>
         <p:xfrm>
-          <a:off x="1097860" y="2092117"/>
+          <a:off x="1241876" y="3809261"/>
           <a:ext cx="6380872" cy="432048"/>
         </p:xfrm>
         <a:graphic>
@@ -6875,12 +7649,23 @@
                     <a:p>
                       <a:pPr algn="ctr"/>
                       <a:r>
-                        <a:rPr lang="en-US" sz="1400" dirty="0">
+                        <a:rPr lang="en-US" sz="900" dirty="0">
                           <a:solidFill>
                             <a:schemeClr val="tx1"/>
                           </a:solidFill>
                         </a:rPr>
-                        <a:t>Field1</a:t>
+                        <a:t>Value</a:t>
+                      </a:r>
+                    </a:p>
+                    <a:p>
+                      <a:pPr algn="ctr"/>
+                      <a:r>
+                        <a:rPr lang="en-US" sz="900" dirty="0">
+                          <a:solidFill>
+                            <a:schemeClr val="tx1"/>
+                          </a:solidFill>
+                        </a:rPr>
+                        <a:t>Obj1</a:t>
                       </a:r>
                     </a:p>
                   </a:txBody>
@@ -6915,12 +7700,39 @@
                         <a:defRPr/>
                       </a:pPr>
                       <a:r>
-                        <a:rPr lang="en-US" sz="1400" dirty="0">
+                        <a:rPr lang="en-US" sz="900" dirty="0">
                           <a:solidFill>
                             <a:schemeClr val="tx1"/>
                           </a:solidFill>
                         </a:rPr>
-                        <a:t>Field2</a:t>
+                        <a:t>Value</a:t>
+                      </a:r>
+                    </a:p>
+                    <a:p>
+                      <a:pPr marL="0" marR="0" indent="0" algn="ctr" defTabSz="914400" rtl="0" eaLnBrk="1" fontAlgn="auto" latinLnBrk="1" hangingPunct="1">
+                        <a:lnSpc>
+                          <a:spcPct val="100000"/>
+                        </a:lnSpc>
+                        <a:spcBef>
+                          <a:spcPts val="0"/>
+                        </a:spcBef>
+                        <a:spcAft>
+                          <a:spcPts val="0"/>
+                        </a:spcAft>
+                        <a:buClrTx/>
+                        <a:buSzTx/>
+                        <a:buFontTx/>
+                        <a:buNone/>
+                        <a:tabLst/>
+                        <a:defRPr/>
+                      </a:pPr>
+                      <a:r>
+                        <a:rPr lang="en-US" sz="900" dirty="0">
+                          <a:solidFill>
+                            <a:schemeClr val="tx1"/>
+                          </a:solidFill>
+                        </a:rPr>
+                        <a:t>Obj2</a:t>
                       </a:r>
                     </a:p>
                   </a:txBody>
@@ -6955,12 +7767,39 @@
                         <a:defRPr/>
                       </a:pPr>
                       <a:r>
-                        <a:rPr lang="en-US" sz="1400" dirty="0">
+                        <a:rPr lang="en-US" sz="900" dirty="0">
                           <a:solidFill>
                             <a:schemeClr val="tx1"/>
                           </a:solidFill>
                         </a:rPr>
-                        <a:t>Field3</a:t>
+                        <a:t>Value</a:t>
+                      </a:r>
+                    </a:p>
+                    <a:p>
+                      <a:pPr marL="0" marR="0" indent="0" algn="ctr" defTabSz="914400" rtl="0" eaLnBrk="1" fontAlgn="auto" latinLnBrk="1" hangingPunct="1">
+                        <a:lnSpc>
+                          <a:spcPct val="100000"/>
+                        </a:lnSpc>
+                        <a:spcBef>
+                          <a:spcPts val="0"/>
+                        </a:spcBef>
+                        <a:spcAft>
+                          <a:spcPts val="0"/>
+                        </a:spcAft>
+                        <a:buClrTx/>
+                        <a:buSzTx/>
+                        <a:buFontTx/>
+                        <a:buNone/>
+                        <a:tabLst/>
+                        <a:defRPr/>
+                      </a:pPr>
+                      <a:r>
+                        <a:rPr lang="en-US" sz="900" dirty="0">
+                          <a:solidFill>
+                            <a:schemeClr val="tx1"/>
+                          </a:solidFill>
+                        </a:rPr>
+                        <a:t>Obj3</a:t>
                       </a:r>
                     </a:p>
                   </a:txBody>
@@ -6995,12 +7834,39 @@
                         <a:defRPr/>
                       </a:pPr>
                       <a:r>
-                        <a:rPr lang="en-US" sz="1400" dirty="0">
+                        <a:rPr lang="en-US" sz="900" dirty="0">
                           <a:solidFill>
                             <a:schemeClr val="tx1"/>
                           </a:solidFill>
                         </a:rPr>
-                        <a:t>Field4</a:t>
+                        <a:t>Value</a:t>
+                      </a:r>
+                    </a:p>
+                    <a:p>
+                      <a:pPr marL="0" marR="0" indent="0" algn="ctr" defTabSz="914400" rtl="0" eaLnBrk="1" fontAlgn="auto" latinLnBrk="1" hangingPunct="1">
+                        <a:lnSpc>
+                          <a:spcPct val="100000"/>
+                        </a:lnSpc>
+                        <a:spcBef>
+                          <a:spcPts val="0"/>
+                        </a:spcBef>
+                        <a:spcAft>
+                          <a:spcPts val="0"/>
+                        </a:spcAft>
+                        <a:buClrTx/>
+                        <a:buSzTx/>
+                        <a:buFontTx/>
+                        <a:buNone/>
+                        <a:tabLst/>
+                        <a:defRPr/>
+                      </a:pPr>
+                      <a:r>
+                        <a:rPr lang="en-US" sz="900" dirty="0">
+                          <a:solidFill>
+                            <a:schemeClr val="tx1"/>
+                          </a:solidFill>
+                        </a:rPr>
+                        <a:t>Obj4</a:t>
                       </a:r>
                     </a:p>
                   </a:txBody>
@@ -7035,12 +7901,39 @@
                         <a:defRPr/>
                       </a:pPr>
                       <a:r>
-                        <a:rPr lang="en-US" sz="1400" dirty="0">
+                        <a:rPr lang="en-US" sz="900" dirty="0">
                           <a:solidFill>
                             <a:schemeClr val="tx1"/>
                           </a:solidFill>
                         </a:rPr>
-                        <a:t>Field5</a:t>
+                        <a:t>Value</a:t>
+                      </a:r>
+                    </a:p>
+                    <a:p>
+                      <a:pPr marL="0" marR="0" indent="0" algn="ctr" defTabSz="914400" rtl="0" eaLnBrk="1" fontAlgn="auto" latinLnBrk="1" hangingPunct="1">
+                        <a:lnSpc>
+                          <a:spcPct val="100000"/>
+                        </a:lnSpc>
+                        <a:spcBef>
+                          <a:spcPts val="0"/>
+                        </a:spcBef>
+                        <a:spcAft>
+                          <a:spcPts val="0"/>
+                        </a:spcAft>
+                        <a:buClrTx/>
+                        <a:buSzTx/>
+                        <a:buFontTx/>
+                        <a:buNone/>
+                        <a:tabLst/>
+                        <a:defRPr/>
+                      </a:pPr>
+                      <a:r>
+                        <a:rPr lang="en-US" sz="900" dirty="0">
+                          <a:solidFill>
+                            <a:schemeClr val="tx1"/>
+                          </a:solidFill>
+                        </a:rPr>
+                        <a:t>Obj5</a:t>
                       </a:r>
                     </a:p>
                   </a:txBody>
@@ -7075,12 +7968,39 @@
                         <a:defRPr/>
                       </a:pPr>
                       <a:r>
-                        <a:rPr lang="en-US" sz="1400" dirty="0">
+                        <a:rPr lang="en-US" sz="900" dirty="0">
                           <a:solidFill>
                             <a:schemeClr val="tx1"/>
                           </a:solidFill>
                         </a:rPr>
-                        <a:t>Field6</a:t>
+                        <a:t>Value</a:t>
+                      </a:r>
+                    </a:p>
+                    <a:p>
+                      <a:pPr marL="0" marR="0" indent="0" algn="ctr" defTabSz="914400" rtl="0" eaLnBrk="1" fontAlgn="auto" latinLnBrk="1" hangingPunct="1">
+                        <a:lnSpc>
+                          <a:spcPct val="100000"/>
+                        </a:lnSpc>
+                        <a:spcBef>
+                          <a:spcPts val="0"/>
+                        </a:spcBef>
+                        <a:spcAft>
+                          <a:spcPts val="0"/>
+                        </a:spcAft>
+                        <a:buClrTx/>
+                        <a:buSzTx/>
+                        <a:buFontTx/>
+                        <a:buNone/>
+                        <a:tabLst/>
+                        <a:defRPr/>
+                      </a:pPr>
+                      <a:r>
+                        <a:rPr lang="en-US" sz="900" dirty="0">
+                          <a:solidFill>
+                            <a:schemeClr val="tx1"/>
+                          </a:solidFill>
+                        </a:rPr>
+                        <a:t>Obj6</a:t>
                       </a:r>
                     </a:p>
                   </a:txBody>
@@ -7115,12 +8035,39 @@
                         <a:defRPr/>
                       </a:pPr>
                       <a:r>
-                        <a:rPr lang="en-US" sz="1400" dirty="0">
+                        <a:rPr lang="en-US" sz="900" dirty="0">
                           <a:solidFill>
                             <a:schemeClr val="tx1"/>
                           </a:solidFill>
                         </a:rPr>
-                        <a:t>Field7</a:t>
+                        <a:t>Value</a:t>
+                      </a:r>
+                    </a:p>
+                    <a:p>
+                      <a:pPr marL="0" marR="0" indent="0" algn="ctr" defTabSz="914400" rtl="0" eaLnBrk="1" fontAlgn="auto" latinLnBrk="1" hangingPunct="1">
+                        <a:lnSpc>
+                          <a:spcPct val="100000"/>
+                        </a:lnSpc>
+                        <a:spcBef>
+                          <a:spcPts val="0"/>
+                        </a:spcBef>
+                        <a:spcAft>
+                          <a:spcPts val="0"/>
+                        </a:spcAft>
+                        <a:buClrTx/>
+                        <a:buSzTx/>
+                        <a:buFontTx/>
+                        <a:buNone/>
+                        <a:tabLst/>
+                        <a:defRPr/>
+                      </a:pPr>
+                      <a:r>
+                        <a:rPr lang="en-US" sz="900" dirty="0">
+                          <a:solidFill>
+                            <a:schemeClr val="tx1"/>
+                          </a:solidFill>
+                        </a:rPr>
+                        <a:t>Obj7</a:t>
                       </a:r>
                     </a:p>
                   </a:txBody>
@@ -7155,7 +8102,7 @@
                         <a:defRPr/>
                       </a:pPr>
                       <a:r>
-                        <a:rPr lang="en-US" sz="1400" dirty="0">
+                        <a:rPr lang="en-US" sz="900" dirty="0">
                           <a:solidFill>
                             <a:schemeClr val="tx1"/>
                           </a:solidFill>
@@ -7190,7 +8137,7 @@
         </p:nvSpPr>
         <p:spPr>
           <a:xfrm>
-            <a:off x="7506572" y="2126624"/>
+            <a:off x="7596336" y="3843768"/>
             <a:ext cx="1584176" cy="307777"/>
           </a:xfrm>
           <a:prstGeom prst="rect">
@@ -7205,15 +8152,33 @@
           <a:lstStyle/>
           <a:p>
             <a:r>
-              <a:rPr lang="en-US" sz="1400" b="1" dirty="0"/>
+              <a:rPr lang="en-US" sz="1400" b="1" dirty="0">
+                <a:solidFill>
+                  <a:schemeClr val="bg1">
+                    <a:lumMod val="50000"/>
+                  </a:schemeClr>
+                </a:solidFill>
+              </a:rPr>
               <a:t>Record </a:t>
             </a:r>
             <a:r>
-              <a:rPr lang="en-US" sz="1400" b="1" dirty="0" err="1"/>
+              <a:rPr lang="en-US" sz="1400" b="1" dirty="0" err="1">
+                <a:solidFill>
+                  <a:schemeClr val="bg1">
+                    <a:lumMod val="50000"/>
+                  </a:schemeClr>
+                </a:solidFill>
+              </a:rPr>
               <a:t>Obj</a:t>
             </a:r>
             <a:r>
-              <a:rPr lang="en-US" sz="1400" b="1" dirty="0"/>
+              <a:rPr lang="en-US" sz="1400" b="1" dirty="0">
+                <a:solidFill>
+                  <a:schemeClr val="bg1">
+                    <a:lumMod val="50000"/>
+                  </a:schemeClr>
+                </a:solidFill>
+              </a:rPr>
               <a:t> 3</a:t>
             </a:r>
           </a:p>
@@ -7228,13 +8193,13 @@
           <p:nvPr>
             <p:extLst>
               <p:ext uri="{D42A27DB-BD31-4B8C-83A1-F6EECF244321}">
-                <p14:modId xmlns:p14="http://schemas.microsoft.com/office/powerpoint/2010/main" val="1144782809"/>
+                <p14:modId xmlns:p14="http://schemas.microsoft.com/office/powerpoint/2010/main" val="3611401539"/>
               </p:ext>
             </p:extLst>
           </p:nvPr>
         </p:nvGraphicFramePr>
         <p:xfrm>
-          <a:off x="1097860" y="2559677"/>
+          <a:off x="1241876" y="4276821"/>
           <a:ext cx="6380872" cy="432048"/>
         </p:xfrm>
         <a:graphic>
@@ -7309,12 +8274,23 @@
                     <a:p>
                       <a:pPr algn="ctr"/>
                       <a:r>
-                        <a:rPr lang="en-US" sz="1400" dirty="0">
+                        <a:rPr lang="en-US" sz="1000" dirty="0">
                           <a:solidFill>
                             <a:schemeClr val="tx1"/>
                           </a:solidFill>
                         </a:rPr>
-                        <a:t>Field1</a:t>
+                        <a:t>Value</a:t>
+                      </a:r>
+                    </a:p>
+                    <a:p>
+                      <a:pPr algn="ctr"/>
+                      <a:r>
+                        <a:rPr lang="en-US" sz="1000" dirty="0">
+                          <a:solidFill>
+                            <a:schemeClr val="tx1"/>
+                          </a:solidFill>
+                        </a:rPr>
+                        <a:t>Obj1</a:t>
                       </a:r>
                     </a:p>
                   </a:txBody>
@@ -7349,12 +8325,39 @@
                         <a:defRPr/>
                       </a:pPr>
                       <a:r>
-                        <a:rPr lang="en-US" sz="1400" dirty="0">
+                        <a:rPr lang="en-US" sz="1000" dirty="0">
                           <a:solidFill>
                             <a:schemeClr val="tx1"/>
                           </a:solidFill>
                         </a:rPr>
-                        <a:t>Field2</a:t>
+                        <a:t>Value</a:t>
+                      </a:r>
+                    </a:p>
+                    <a:p>
+                      <a:pPr marL="0" marR="0" indent="0" algn="ctr" defTabSz="914400" rtl="0" eaLnBrk="1" fontAlgn="auto" latinLnBrk="1" hangingPunct="1">
+                        <a:lnSpc>
+                          <a:spcPct val="100000"/>
+                        </a:lnSpc>
+                        <a:spcBef>
+                          <a:spcPts val="0"/>
+                        </a:spcBef>
+                        <a:spcAft>
+                          <a:spcPts val="0"/>
+                        </a:spcAft>
+                        <a:buClrTx/>
+                        <a:buSzTx/>
+                        <a:buFontTx/>
+                        <a:buNone/>
+                        <a:tabLst/>
+                        <a:defRPr/>
+                      </a:pPr>
+                      <a:r>
+                        <a:rPr lang="en-US" sz="1000" dirty="0">
+                          <a:solidFill>
+                            <a:schemeClr val="tx1"/>
+                          </a:solidFill>
+                        </a:rPr>
+                        <a:t>Obj2</a:t>
                       </a:r>
                     </a:p>
                   </a:txBody>
@@ -7389,12 +8392,39 @@
                         <a:defRPr/>
                       </a:pPr>
                       <a:r>
-                        <a:rPr lang="en-US" sz="1400" dirty="0">
+                        <a:rPr lang="en-US" sz="1000" dirty="0">
                           <a:solidFill>
                             <a:schemeClr val="tx1"/>
                           </a:solidFill>
                         </a:rPr>
-                        <a:t>Field3</a:t>
+                        <a:t>Value</a:t>
+                      </a:r>
+                    </a:p>
+                    <a:p>
+                      <a:pPr marL="0" marR="0" indent="0" algn="ctr" defTabSz="914400" rtl="0" eaLnBrk="1" fontAlgn="auto" latinLnBrk="1" hangingPunct="1">
+                        <a:lnSpc>
+                          <a:spcPct val="100000"/>
+                        </a:lnSpc>
+                        <a:spcBef>
+                          <a:spcPts val="0"/>
+                        </a:spcBef>
+                        <a:spcAft>
+                          <a:spcPts val="0"/>
+                        </a:spcAft>
+                        <a:buClrTx/>
+                        <a:buSzTx/>
+                        <a:buFontTx/>
+                        <a:buNone/>
+                        <a:tabLst/>
+                        <a:defRPr/>
+                      </a:pPr>
+                      <a:r>
+                        <a:rPr lang="en-US" sz="1000" dirty="0">
+                          <a:solidFill>
+                            <a:schemeClr val="tx1"/>
+                          </a:solidFill>
+                        </a:rPr>
+                        <a:t>Obj3</a:t>
                       </a:r>
                     </a:p>
                   </a:txBody>
@@ -7429,12 +8459,39 @@
                         <a:defRPr/>
                       </a:pPr>
                       <a:r>
-                        <a:rPr lang="en-US" sz="1400" dirty="0">
+                        <a:rPr lang="en-US" sz="1000" dirty="0">
                           <a:solidFill>
                             <a:schemeClr val="tx1"/>
                           </a:solidFill>
                         </a:rPr>
-                        <a:t>Field4</a:t>
+                        <a:t>Value</a:t>
+                      </a:r>
+                    </a:p>
+                    <a:p>
+                      <a:pPr marL="0" marR="0" indent="0" algn="ctr" defTabSz="914400" rtl="0" eaLnBrk="1" fontAlgn="auto" latinLnBrk="1" hangingPunct="1">
+                        <a:lnSpc>
+                          <a:spcPct val="100000"/>
+                        </a:lnSpc>
+                        <a:spcBef>
+                          <a:spcPts val="0"/>
+                        </a:spcBef>
+                        <a:spcAft>
+                          <a:spcPts val="0"/>
+                        </a:spcAft>
+                        <a:buClrTx/>
+                        <a:buSzTx/>
+                        <a:buFontTx/>
+                        <a:buNone/>
+                        <a:tabLst/>
+                        <a:defRPr/>
+                      </a:pPr>
+                      <a:r>
+                        <a:rPr lang="en-US" sz="1000" dirty="0">
+                          <a:solidFill>
+                            <a:schemeClr val="tx1"/>
+                          </a:solidFill>
+                        </a:rPr>
+                        <a:t>Obj4</a:t>
                       </a:r>
                     </a:p>
                   </a:txBody>
@@ -7469,12 +8526,39 @@
                         <a:defRPr/>
                       </a:pPr>
                       <a:r>
-                        <a:rPr lang="en-US" sz="1400" dirty="0">
+                        <a:rPr lang="en-US" sz="1000" dirty="0">
                           <a:solidFill>
                             <a:schemeClr val="tx1"/>
                           </a:solidFill>
                         </a:rPr>
-                        <a:t>Field5</a:t>
+                        <a:t>Value</a:t>
+                      </a:r>
+                    </a:p>
+                    <a:p>
+                      <a:pPr marL="0" marR="0" indent="0" algn="ctr" defTabSz="914400" rtl="0" eaLnBrk="1" fontAlgn="auto" latinLnBrk="1" hangingPunct="1">
+                        <a:lnSpc>
+                          <a:spcPct val="100000"/>
+                        </a:lnSpc>
+                        <a:spcBef>
+                          <a:spcPts val="0"/>
+                        </a:spcBef>
+                        <a:spcAft>
+                          <a:spcPts val="0"/>
+                        </a:spcAft>
+                        <a:buClrTx/>
+                        <a:buSzTx/>
+                        <a:buFontTx/>
+                        <a:buNone/>
+                        <a:tabLst/>
+                        <a:defRPr/>
+                      </a:pPr>
+                      <a:r>
+                        <a:rPr lang="en-US" sz="1000" dirty="0">
+                          <a:solidFill>
+                            <a:schemeClr val="tx1"/>
+                          </a:solidFill>
+                        </a:rPr>
+                        <a:t>Obj5</a:t>
                       </a:r>
                     </a:p>
                   </a:txBody>
@@ -7509,12 +8593,39 @@
                         <a:defRPr/>
                       </a:pPr>
                       <a:r>
-                        <a:rPr lang="en-US" sz="1400" dirty="0">
+                        <a:rPr lang="en-US" sz="1000" dirty="0">
                           <a:solidFill>
                             <a:schemeClr val="tx1"/>
                           </a:solidFill>
                         </a:rPr>
-                        <a:t>Field6</a:t>
+                        <a:t>Value</a:t>
+                      </a:r>
+                    </a:p>
+                    <a:p>
+                      <a:pPr marL="0" marR="0" indent="0" algn="ctr" defTabSz="914400" rtl="0" eaLnBrk="1" fontAlgn="auto" latinLnBrk="1" hangingPunct="1">
+                        <a:lnSpc>
+                          <a:spcPct val="100000"/>
+                        </a:lnSpc>
+                        <a:spcBef>
+                          <a:spcPts val="0"/>
+                        </a:spcBef>
+                        <a:spcAft>
+                          <a:spcPts val="0"/>
+                        </a:spcAft>
+                        <a:buClrTx/>
+                        <a:buSzTx/>
+                        <a:buFontTx/>
+                        <a:buNone/>
+                        <a:tabLst/>
+                        <a:defRPr/>
+                      </a:pPr>
+                      <a:r>
+                        <a:rPr lang="en-US" sz="1000" dirty="0">
+                          <a:solidFill>
+                            <a:schemeClr val="tx1"/>
+                          </a:solidFill>
+                        </a:rPr>
+                        <a:t>Obj6</a:t>
                       </a:r>
                     </a:p>
                   </a:txBody>
@@ -7549,12 +8660,39 @@
                         <a:defRPr/>
                       </a:pPr>
                       <a:r>
-                        <a:rPr lang="en-US" sz="1400" dirty="0">
+                        <a:rPr lang="en-US" sz="1000" dirty="0">
                           <a:solidFill>
                             <a:schemeClr val="tx1"/>
                           </a:solidFill>
                         </a:rPr>
-                        <a:t>Field7</a:t>
+                        <a:t>Value</a:t>
+                      </a:r>
+                    </a:p>
+                    <a:p>
+                      <a:pPr marL="0" marR="0" indent="0" algn="ctr" defTabSz="914400" rtl="0" eaLnBrk="1" fontAlgn="auto" latinLnBrk="1" hangingPunct="1">
+                        <a:lnSpc>
+                          <a:spcPct val="100000"/>
+                        </a:lnSpc>
+                        <a:spcBef>
+                          <a:spcPts val="0"/>
+                        </a:spcBef>
+                        <a:spcAft>
+                          <a:spcPts val="0"/>
+                        </a:spcAft>
+                        <a:buClrTx/>
+                        <a:buSzTx/>
+                        <a:buFontTx/>
+                        <a:buNone/>
+                        <a:tabLst/>
+                        <a:defRPr/>
+                      </a:pPr>
+                      <a:r>
+                        <a:rPr lang="en-US" sz="1000" dirty="0">
+                          <a:solidFill>
+                            <a:schemeClr val="tx1"/>
+                          </a:solidFill>
+                        </a:rPr>
+                        <a:t>Obj7</a:t>
                       </a:r>
                     </a:p>
                   </a:txBody>
@@ -7589,7 +8727,7 @@
                         <a:defRPr/>
                       </a:pPr>
                       <a:r>
-                        <a:rPr lang="en-US" sz="1400" dirty="0">
+                        <a:rPr lang="en-US" sz="1000" dirty="0">
                           <a:solidFill>
                             <a:schemeClr val="tx1"/>
                           </a:solidFill>
@@ -7624,7 +8762,7 @@
         </p:nvSpPr>
         <p:spPr>
           <a:xfrm>
-            <a:off x="7506572" y="2594184"/>
+            <a:off x="7596336" y="4311328"/>
             <a:ext cx="1584176" cy="307777"/>
           </a:xfrm>
           <a:prstGeom prst="rect">
@@ -7639,15 +8777,33 @@
           <a:lstStyle/>
           <a:p>
             <a:r>
-              <a:rPr lang="en-US" sz="1400" b="1" dirty="0"/>
+              <a:rPr lang="en-US" sz="1400" b="1" dirty="0">
+                <a:solidFill>
+                  <a:schemeClr val="bg1">
+                    <a:lumMod val="50000"/>
+                  </a:schemeClr>
+                </a:solidFill>
+              </a:rPr>
               <a:t>Record </a:t>
             </a:r>
             <a:r>
-              <a:rPr lang="en-US" sz="1400" b="1" dirty="0" err="1"/>
+              <a:rPr lang="en-US" sz="1400" b="1" dirty="0" err="1">
+                <a:solidFill>
+                  <a:schemeClr val="bg1">
+                    <a:lumMod val="50000"/>
+                  </a:schemeClr>
+                </a:solidFill>
+              </a:rPr>
               <a:t>Obj</a:t>
             </a:r>
             <a:r>
-              <a:rPr lang="en-US" sz="1400" b="1" dirty="0"/>
+              <a:rPr lang="en-US" sz="1400" b="1" dirty="0">
+                <a:solidFill>
+                  <a:schemeClr val="bg1">
+                    <a:lumMod val="50000"/>
+                  </a:schemeClr>
+                </a:solidFill>
+              </a:rPr>
               <a:t> 4</a:t>
             </a:r>
           </a:p>
@@ -7661,7 +8817,7 @@
         </p:nvSpPr>
         <p:spPr>
           <a:xfrm>
-            <a:off x="179512" y="3702928"/>
+            <a:off x="323528" y="5229200"/>
             <a:ext cx="7687100" cy="369332"/>
           </a:xfrm>
           <a:prstGeom prst="rect">
@@ -7676,12 +8832,19 @@
           <a:lstStyle/>
           <a:p>
             <a:r>
-              <a:rPr lang="en-US" b="1" dirty="0" err="1"/>
-              <a:t>ArrayList</a:t>
-            </a:r>
-            <a:r>
               <a:rPr lang="en-US" b="1" dirty="0"/>
-              <a:t> data type (String, Number, … - implements Comparable)</a:t>
+              <a:t>Table.java : </a:t>
+            </a:r>
+            <a:r>
+              <a:rPr lang="en-US" b="1" dirty="0">
+                <a:solidFill>
+                  <a:schemeClr val="tx2">
+                    <a:lumMod val="60000"/>
+                    <a:lumOff val="40000"/>
+                  </a:schemeClr>
+                </a:solidFill>
+              </a:rPr>
+              <a:t>ArrayList&lt;Field&gt; alField</a:t>
             </a:r>
           </a:p>
         </p:txBody>
@@ -7695,14 +8858,14 @@
           <p:nvPr>
             <p:extLst>
               <p:ext uri="{D42A27DB-BD31-4B8C-83A1-F6EECF244321}">
-                <p14:modId xmlns:p14="http://schemas.microsoft.com/office/powerpoint/2010/main" val="3943867620"/>
+                <p14:modId xmlns:p14="http://schemas.microsoft.com/office/powerpoint/2010/main" val="2557338383"/>
               </p:ext>
             </p:extLst>
           </p:nvPr>
         </p:nvGraphicFramePr>
         <p:xfrm>
-          <a:off x="261604" y="4062968"/>
-          <a:ext cx="7217128" cy="518160"/>
+          <a:off x="405620" y="5589240"/>
+          <a:ext cx="7217128" cy="457200"/>
         </p:xfrm>
         <a:graphic>
           <a:graphicData uri="http://schemas.openxmlformats.org/drawingml/2006/table">
@@ -7776,28 +8939,483 @@
                     <a:p>
                       <a:pPr algn="ctr"/>
                       <a:r>
-                        <a:rPr lang="en-US" sz="1400" dirty="0">
+                        <a:rPr lang="en-US" sz="1200" dirty="0">
                           <a:solidFill>
                             <a:schemeClr val="tx1"/>
                           </a:solidFill>
                         </a:rPr>
-                        <a:t>Field1’s</a:t>
+                        <a:t>Field </a:t>
                       </a:r>
+                    </a:p>
+                    <a:p>
+                      <a:pPr algn="ctr"/>
                       <a:r>
-                        <a:rPr lang="en-US" sz="1400" baseline="0" dirty="0">
+                        <a:rPr lang="en-US" sz="1200" dirty="0">
                           <a:solidFill>
                             <a:schemeClr val="tx1"/>
                           </a:solidFill>
                         </a:rPr>
-                        <a:t> </a:t>
+                        <a:t>Obj1</a:t>
                       </a:r>
+                    </a:p>
+                  </a:txBody>
+                  <a:tcPr anchor="ctr">
+                    <a:solidFill>
+                      <a:schemeClr val="bg1">
+                        <a:lumMod val="95000"/>
+                      </a:schemeClr>
+                    </a:solidFill>
+                  </a:tcPr>
+                </a:tc>
+                <a:tc>
+                  <a:txBody>
+                    <a:bodyPr/>
+                    <a:lstStyle/>
+                    <a:p>
+                      <a:pPr algn="ctr"/>
                       <a:r>
-                        <a:rPr lang="en-US" sz="1400" dirty="0">
+                        <a:rPr lang="en-US" sz="1200" dirty="0">
                           <a:solidFill>
                             <a:schemeClr val="tx1"/>
                           </a:solidFill>
                         </a:rPr>
-                        <a:t>type</a:t>
+                        <a:t>Field </a:t>
+                      </a:r>
+                    </a:p>
+                    <a:p>
+                      <a:pPr algn="ctr"/>
+                      <a:r>
+                        <a:rPr lang="en-US" sz="1200" dirty="0">
+                          <a:solidFill>
+                            <a:schemeClr val="tx1"/>
+                          </a:solidFill>
+                        </a:rPr>
+                        <a:t>Obj2</a:t>
+                      </a:r>
+                    </a:p>
+                  </a:txBody>
+                  <a:tcPr anchor="ctr">
+                    <a:solidFill>
+                      <a:schemeClr val="bg1">
+                        <a:lumMod val="95000"/>
+                      </a:schemeClr>
+                    </a:solidFill>
+                  </a:tcPr>
+                </a:tc>
+                <a:tc>
+                  <a:txBody>
+                    <a:bodyPr/>
+                    <a:lstStyle/>
+                    <a:p>
+                      <a:pPr marL="0" marR="0" lvl="0" indent="0" algn="ctr" defTabSz="914400" rtl="0" eaLnBrk="1" fontAlgn="auto" latinLnBrk="1" hangingPunct="1">
+                        <a:lnSpc>
+                          <a:spcPct val="100000"/>
+                        </a:lnSpc>
+                        <a:spcBef>
+                          <a:spcPts val="0"/>
+                        </a:spcBef>
+                        <a:spcAft>
+                          <a:spcPts val="0"/>
+                        </a:spcAft>
+                        <a:buClrTx/>
+                        <a:buSzTx/>
+                        <a:buFontTx/>
+                        <a:buNone/>
+                        <a:tabLst/>
+                        <a:defRPr/>
+                      </a:pPr>
+                      <a:r>
+                        <a:rPr kumimoji="0" lang="en-US" sz="1200" b="1" i="0" u="none" strike="noStrike" kern="1200" cap="none" spc="0" normalizeH="0" baseline="0" noProof="0" dirty="0">
+                          <a:ln>
+                            <a:noFill/>
+                          </a:ln>
+                          <a:solidFill>
+                            <a:prstClr val="black"/>
+                          </a:solidFill>
+                          <a:effectLst/>
+                          <a:uLnTx/>
+                          <a:uFillTx/>
+                          <a:latin typeface="맑은 고딕"/>
+                          <a:ea typeface="+mn-ea"/>
+                          <a:cs typeface="+mn-cs"/>
+                        </a:rPr>
+                        <a:t>Field </a:t>
+                      </a:r>
+                    </a:p>
+                    <a:p>
+                      <a:pPr marL="0" marR="0" lvl="0" indent="0" algn="ctr" defTabSz="914400" rtl="0" eaLnBrk="1" fontAlgn="auto" latinLnBrk="1" hangingPunct="1">
+                        <a:lnSpc>
+                          <a:spcPct val="100000"/>
+                        </a:lnSpc>
+                        <a:spcBef>
+                          <a:spcPts val="0"/>
+                        </a:spcBef>
+                        <a:spcAft>
+                          <a:spcPts val="0"/>
+                        </a:spcAft>
+                        <a:buClrTx/>
+                        <a:buSzTx/>
+                        <a:buFontTx/>
+                        <a:buNone/>
+                        <a:tabLst/>
+                        <a:defRPr/>
+                      </a:pPr>
+                      <a:r>
+                        <a:rPr kumimoji="0" lang="en-US" sz="1200" b="1" i="0" u="none" strike="noStrike" kern="1200" cap="none" spc="0" normalizeH="0" baseline="0" noProof="0" dirty="0">
+                          <a:ln>
+                            <a:noFill/>
+                          </a:ln>
+                          <a:solidFill>
+                            <a:prstClr val="black"/>
+                          </a:solidFill>
+                          <a:effectLst/>
+                          <a:uLnTx/>
+                          <a:uFillTx/>
+                          <a:latin typeface="맑은 고딕"/>
+                          <a:ea typeface="+mn-ea"/>
+                          <a:cs typeface="+mn-cs"/>
+                        </a:rPr>
+                        <a:t>Obj3</a:t>
+                      </a:r>
+                    </a:p>
+                  </a:txBody>
+                  <a:tcPr anchor="ctr">
+                    <a:solidFill>
+                      <a:schemeClr val="bg1">
+                        <a:lumMod val="95000"/>
+                      </a:schemeClr>
+                    </a:solidFill>
+                  </a:tcPr>
+                </a:tc>
+                <a:tc>
+                  <a:txBody>
+                    <a:bodyPr/>
+                    <a:lstStyle/>
+                    <a:p>
+                      <a:pPr marL="0" marR="0" lvl="0" indent="0" algn="ctr" defTabSz="914400" rtl="0" eaLnBrk="1" fontAlgn="auto" latinLnBrk="1" hangingPunct="1">
+                        <a:lnSpc>
+                          <a:spcPct val="100000"/>
+                        </a:lnSpc>
+                        <a:spcBef>
+                          <a:spcPts val="0"/>
+                        </a:spcBef>
+                        <a:spcAft>
+                          <a:spcPts val="0"/>
+                        </a:spcAft>
+                        <a:buClrTx/>
+                        <a:buSzTx/>
+                        <a:buFontTx/>
+                        <a:buNone/>
+                        <a:tabLst/>
+                        <a:defRPr/>
+                      </a:pPr>
+                      <a:r>
+                        <a:rPr kumimoji="0" lang="en-US" sz="1200" b="1" i="0" u="none" strike="noStrike" kern="1200" cap="none" spc="0" normalizeH="0" baseline="0" noProof="0" dirty="0">
+                          <a:ln>
+                            <a:noFill/>
+                          </a:ln>
+                          <a:solidFill>
+                            <a:prstClr val="black"/>
+                          </a:solidFill>
+                          <a:effectLst/>
+                          <a:uLnTx/>
+                          <a:uFillTx/>
+                          <a:latin typeface="맑은 고딕"/>
+                          <a:ea typeface="+mn-ea"/>
+                          <a:cs typeface="+mn-cs"/>
+                        </a:rPr>
+                        <a:t>Field </a:t>
+                      </a:r>
+                    </a:p>
+                    <a:p>
+                      <a:pPr marL="0" marR="0" lvl="0" indent="0" algn="ctr" defTabSz="914400" rtl="0" eaLnBrk="1" fontAlgn="auto" latinLnBrk="1" hangingPunct="1">
+                        <a:lnSpc>
+                          <a:spcPct val="100000"/>
+                        </a:lnSpc>
+                        <a:spcBef>
+                          <a:spcPts val="0"/>
+                        </a:spcBef>
+                        <a:spcAft>
+                          <a:spcPts val="0"/>
+                        </a:spcAft>
+                        <a:buClrTx/>
+                        <a:buSzTx/>
+                        <a:buFontTx/>
+                        <a:buNone/>
+                        <a:tabLst/>
+                        <a:defRPr/>
+                      </a:pPr>
+                      <a:r>
+                        <a:rPr kumimoji="0" lang="en-US" sz="1200" b="1" i="0" u="none" strike="noStrike" kern="1200" cap="none" spc="0" normalizeH="0" baseline="0" noProof="0" dirty="0">
+                          <a:ln>
+                            <a:noFill/>
+                          </a:ln>
+                          <a:solidFill>
+                            <a:prstClr val="black"/>
+                          </a:solidFill>
+                          <a:effectLst/>
+                          <a:uLnTx/>
+                          <a:uFillTx/>
+                          <a:latin typeface="맑은 고딕"/>
+                          <a:ea typeface="+mn-ea"/>
+                          <a:cs typeface="+mn-cs"/>
+                        </a:rPr>
+                        <a:t>Obj4</a:t>
+                      </a:r>
+                    </a:p>
+                  </a:txBody>
+                  <a:tcPr anchor="ctr">
+                    <a:solidFill>
+                      <a:schemeClr val="bg1">
+                        <a:lumMod val="95000"/>
+                      </a:schemeClr>
+                    </a:solidFill>
+                  </a:tcPr>
+                </a:tc>
+                <a:tc>
+                  <a:txBody>
+                    <a:bodyPr/>
+                    <a:lstStyle/>
+                    <a:p>
+                      <a:pPr marL="0" marR="0" lvl="0" indent="0" algn="ctr" defTabSz="914400" rtl="0" eaLnBrk="1" fontAlgn="auto" latinLnBrk="1" hangingPunct="1">
+                        <a:lnSpc>
+                          <a:spcPct val="100000"/>
+                        </a:lnSpc>
+                        <a:spcBef>
+                          <a:spcPts val="0"/>
+                        </a:spcBef>
+                        <a:spcAft>
+                          <a:spcPts val="0"/>
+                        </a:spcAft>
+                        <a:buClrTx/>
+                        <a:buSzTx/>
+                        <a:buFontTx/>
+                        <a:buNone/>
+                        <a:tabLst/>
+                        <a:defRPr/>
+                      </a:pPr>
+                      <a:r>
+                        <a:rPr kumimoji="0" lang="en-US" sz="1200" b="1" i="0" u="none" strike="noStrike" kern="1200" cap="none" spc="0" normalizeH="0" baseline="0" noProof="0" dirty="0">
+                          <a:ln>
+                            <a:noFill/>
+                          </a:ln>
+                          <a:solidFill>
+                            <a:prstClr val="black"/>
+                          </a:solidFill>
+                          <a:effectLst/>
+                          <a:uLnTx/>
+                          <a:uFillTx/>
+                          <a:latin typeface="맑은 고딕"/>
+                          <a:ea typeface="+mn-ea"/>
+                          <a:cs typeface="+mn-cs"/>
+                        </a:rPr>
+                        <a:t>Field </a:t>
+                      </a:r>
+                    </a:p>
+                    <a:p>
+                      <a:pPr marL="0" marR="0" lvl="0" indent="0" algn="ctr" defTabSz="914400" rtl="0" eaLnBrk="1" fontAlgn="auto" latinLnBrk="1" hangingPunct="1">
+                        <a:lnSpc>
+                          <a:spcPct val="100000"/>
+                        </a:lnSpc>
+                        <a:spcBef>
+                          <a:spcPts val="0"/>
+                        </a:spcBef>
+                        <a:spcAft>
+                          <a:spcPts val="0"/>
+                        </a:spcAft>
+                        <a:buClrTx/>
+                        <a:buSzTx/>
+                        <a:buFontTx/>
+                        <a:buNone/>
+                        <a:tabLst/>
+                        <a:defRPr/>
+                      </a:pPr>
+                      <a:r>
+                        <a:rPr kumimoji="0" lang="en-US" sz="1200" b="1" i="0" u="none" strike="noStrike" kern="1200" cap="none" spc="0" normalizeH="0" baseline="0" noProof="0" dirty="0">
+                          <a:ln>
+                            <a:noFill/>
+                          </a:ln>
+                          <a:solidFill>
+                            <a:prstClr val="black"/>
+                          </a:solidFill>
+                          <a:effectLst/>
+                          <a:uLnTx/>
+                          <a:uFillTx/>
+                          <a:latin typeface="맑은 고딕"/>
+                          <a:ea typeface="+mn-ea"/>
+                          <a:cs typeface="+mn-cs"/>
+                        </a:rPr>
+                        <a:t>Obj5</a:t>
+                      </a:r>
+                    </a:p>
+                  </a:txBody>
+                  <a:tcPr anchor="ctr">
+                    <a:solidFill>
+                      <a:schemeClr val="bg1">
+                        <a:lumMod val="95000"/>
+                      </a:schemeClr>
+                    </a:solidFill>
+                  </a:tcPr>
+                </a:tc>
+                <a:tc>
+                  <a:txBody>
+                    <a:bodyPr/>
+                    <a:lstStyle/>
+                    <a:p>
+                      <a:pPr marL="0" marR="0" lvl="0" indent="0" algn="ctr" defTabSz="914400" rtl="0" eaLnBrk="1" fontAlgn="auto" latinLnBrk="1" hangingPunct="1">
+                        <a:lnSpc>
+                          <a:spcPct val="100000"/>
+                        </a:lnSpc>
+                        <a:spcBef>
+                          <a:spcPts val="0"/>
+                        </a:spcBef>
+                        <a:spcAft>
+                          <a:spcPts val="0"/>
+                        </a:spcAft>
+                        <a:buClrTx/>
+                        <a:buSzTx/>
+                        <a:buFontTx/>
+                        <a:buNone/>
+                        <a:tabLst/>
+                        <a:defRPr/>
+                      </a:pPr>
+                      <a:r>
+                        <a:rPr kumimoji="0" lang="en-US" sz="1200" b="1" i="0" u="none" strike="noStrike" kern="1200" cap="none" spc="0" normalizeH="0" baseline="0" noProof="0" dirty="0">
+                          <a:ln>
+                            <a:noFill/>
+                          </a:ln>
+                          <a:solidFill>
+                            <a:prstClr val="black"/>
+                          </a:solidFill>
+                          <a:effectLst/>
+                          <a:uLnTx/>
+                          <a:uFillTx/>
+                          <a:latin typeface="맑은 고딕"/>
+                          <a:ea typeface="+mn-ea"/>
+                          <a:cs typeface="+mn-cs"/>
+                        </a:rPr>
+                        <a:t>Field </a:t>
+                      </a:r>
+                    </a:p>
+                    <a:p>
+                      <a:pPr marL="0" marR="0" lvl="0" indent="0" algn="ctr" defTabSz="914400" rtl="0" eaLnBrk="1" fontAlgn="auto" latinLnBrk="1" hangingPunct="1">
+                        <a:lnSpc>
+                          <a:spcPct val="100000"/>
+                        </a:lnSpc>
+                        <a:spcBef>
+                          <a:spcPts val="0"/>
+                        </a:spcBef>
+                        <a:spcAft>
+                          <a:spcPts val="0"/>
+                        </a:spcAft>
+                        <a:buClrTx/>
+                        <a:buSzTx/>
+                        <a:buFontTx/>
+                        <a:buNone/>
+                        <a:tabLst/>
+                        <a:defRPr/>
+                      </a:pPr>
+                      <a:r>
+                        <a:rPr kumimoji="0" lang="en-US" sz="1200" b="1" i="0" u="none" strike="noStrike" kern="1200" cap="none" spc="0" normalizeH="0" baseline="0" noProof="0" dirty="0">
+                          <a:ln>
+                            <a:noFill/>
+                          </a:ln>
+                          <a:solidFill>
+                            <a:prstClr val="black"/>
+                          </a:solidFill>
+                          <a:effectLst/>
+                          <a:uLnTx/>
+                          <a:uFillTx/>
+                          <a:latin typeface="맑은 고딕"/>
+                          <a:ea typeface="+mn-ea"/>
+                          <a:cs typeface="+mn-cs"/>
+                        </a:rPr>
+                        <a:t>Obj6</a:t>
+                      </a:r>
+                    </a:p>
+                  </a:txBody>
+                  <a:tcPr anchor="ctr">
+                    <a:solidFill>
+                      <a:schemeClr val="bg1">
+                        <a:lumMod val="95000"/>
+                      </a:schemeClr>
+                    </a:solidFill>
+                  </a:tcPr>
+                </a:tc>
+                <a:tc>
+                  <a:txBody>
+                    <a:bodyPr/>
+                    <a:lstStyle/>
+                    <a:p>
+                      <a:pPr marL="0" marR="0" lvl="0" indent="0" algn="ctr" defTabSz="914400" rtl="0" eaLnBrk="1" fontAlgn="auto" latinLnBrk="1" hangingPunct="1">
+                        <a:lnSpc>
+                          <a:spcPct val="100000"/>
+                        </a:lnSpc>
+                        <a:spcBef>
+                          <a:spcPts val="0"/>
+                        </a:spcBef>
+                        <a:spcAft>
+                          <a:spcPts val="0"/>
+                        </a:spcAft>
+                        <a:buClrTx/>
+                        <a:buSzTx/>
+                        <a:buFontTx/>
+                        <a:buNone/>
+                        <a:tabLst/>
+                        <a:defRPr/>
+                      </a:pPr>
+                      <a:r>
+                        <a:rPr kumimoji="0" lang="en-US" sz="1200" b="1" i="0" u="none" strike="noStrike" kern="1200" cap="none" spc="0" normalizeH="0" baseline="0" noProof="0" dirty="0">
+                          <a:ln>
+                            <a:noFill/>
+                          </a:ln>
+                          <a:solidFill>
+                            <a:prstClr val="black"/>
+                          </a:solidFill>
+                          <a:effectLst/>
+                          <a:uLnTx/>
+                          <a:uFillTx/>
+                          <a:latin typeface="맑은 고딕"/>
+                          <a:ea typeface="+mn-ea"/>
+                          <a:cs typeface="+mn-cs"/>
+                        </a:rPr>
+                        <a:t>Field </a:t>
+                      </a:r>
+                    </a:p>
+                    <a:p>
+                      <a:pPr marL="0" marR="0" lvl="0" indent="0" algn="ctr" defTabSz="914400" rtl="0" eaLnBrk="1" fontAlgn="auto" latinLnBrk="1" hangingPunct="1">
+                        <a:lnSpc>
+                          <a:spcPct val="100000"/>
+                        </a:lnSpc>
+                        <a:spcBef>
+                          <a:spcPts val="0"/>
+                        </a:spcBef>
+                        <a:spcAft>
+                          <a:spcPts val="0"/>
+                        </a:spcAft>
+                        <a:buClrTx/>
+                        <a:buSzTx/>
+                        <a:buFontTx/>
+                        <a:buNone/>
+                        <a:tabLst/>
+                        <a:defRPr/>
+                      </a:pPr>
+                      <a:r>
+                        <a:rPr kumimoji="0" lang="en-US" sz="1200" b="1" i="0" u="none" strike="noStrike" kern="1200" cap="none" spc="0" normalizeH="0" baseline="0" noProof="0" dirty="0">
+                          <a:ln>
+                            <a:noFill/>
+                          </a:ln>
+                          <a:solidFill>
+                            <a:prstClr val="black"/>
+                          </a:solidFill>
+                          <a:effectLst/>
+                          <a:uLnTx/>
+                          <a:uFillTx/>
+                          <a:latin typeface="맑은 고딕"/>
+                          <a:ea typeface="+mn-ea"/>
+                          <a:cs typeface="+mn-cs"/>
+                        </a:rPr>
+                        <a:t>Obj7</a:t>
                       </a:r>
                     </a:p>
                   </a:txBody>
@@ -7832,343 +9450,7 @@
                         <a:defRPr/>
                       </a:pPr>
                       <a:r>
-                        <a:rPr lang="en-US" sz="1400" dirty="0">
-                          <a:solidFill>
-                            <a:schemeClr val="tx1"/>
-                          </a:solidFill>
-                        </a:rPr>
-                        <a:t>Field2’s</a:t>
-                      </a:r>
-                      <a:r>
-                        <a:rPr lang="en-US" sz="1400" baseline="0" dirty="0">
-                          <a:solidFill>
-                            <a:schemeClr val="tx1"/>
-                          </a:solidFill>
-                        </a:rPr>
-                        <a:t> </a:t>
-                      </a:r>
-                      <a:r>
-                        <a:rPr lang="en-US" sz="1400" dirty="0">
-                          <a:solidFill>
-                            <a:schemeClr val="tx1"/>
-                          </a:solidFill>
-                        </a:rPr>
-                        <a:t>type</a:t>
-                      </a:r>
-                    </a:p>
-                  </a:txBody>
-                  <a:tcPr anchor="ctr">
-                    <a:solidFill>
-                      <a:schemeClr val="bg1">
-                        <a:lumMod val="95000"/>
-                      </a:schemeClr>
-                    </a:solidFill>
-                  </a:tcPr>
-                </a:tc>
-                <a:tc>
-                  <a:txBody>
-                    <a:bodyPr/>
-                    <a:lstStyle/>
-                    <a:p>
-                      <a:pPr marL="0" marR="0" indent="0" algn="ctr" defTabSz="914400" rtl="0" eaLnBrk="1" fontAlgn="auto" latinLnBrk="1" hangingPunct="1">
-                        <a:lnSpc>
-                          <a:spcPct val="100000"/>
-                        </a:lnSpc>
-                        <a:spcBef>
-                          <a:spcPts val="0"/>
-                        </a:spcBef>
-                        <a:spcAft>
-                          <a:spcPts val="0"/>
-                        </a:spcAft>
-                        <a:buClrTx/>
-                        <a:buSzTx/>
-                        <a:buFontTx/>
-                        <a:buNone/>
-                        <a:tabLst/>
-                        <a:defRPr/>
-                      </a:pPr>
-                      <a:r>
-                        <a:rPr lang="en-US" sz="1400" dirty="0">
-                          <a:solidFill>
-                            <a:schemeClr val="tx1"/>
-                          </a:solidFill>
-                        </a:rPr>
-                        <a:t>Field3’s</a:t>
-                      </a:r>
-                      <a:r>
-                        <a:rPr lang="en-US" sz="1400" baseline="0" dirty="0">
-                          <a:solidFill>
-                            <a:schemeClr val="tx1"/>
-                          </a:solidFill>
-                        </a:rPr>
-                        <a:t> </a:t>
-                      </a:r>
-                      <a:r>
-                        <a:rPr lang="en-US" sz="1400" dirty="0">
-                          <a:solidFill>
-                            <a:schemeClr val="tx1"/>
-                          </a:solidFill>
-                        </a:rPr>
-                        <a:t>type</a:t>
-                      </a:r>
-                    </a:p>
-                  </a:txBody>
-                  <a:tcPr anchor="ctr">
-                    <a:solidFill>
-                      <a:schemeClr val="bg1">
-                        <a:lumMod val="95000"/>
-                      </a:schemeClr>
-                    </a:solidFill>
-                  </a:tcPr>
-                </a:tc>
-                <a:tc>
-                  <a:txBody>
-                    <a:bodyPr/>
-                    <a:lstStyle/>
-                    <a:p>
-                      <a:pPr marL="0" marR="0" indent="0" algn="ctr" defTabSz="914400" rtl="0" eaLnBrk="1" fontAlgn="auto" latinLnBrk="1" hangingPunct="1">
-                        <a:lnSpc>
-                          <a:spcPct val="100000"/>
-                        </a:lnSpc>
-                        <a:spcBef>
-                          <a:spcPts val="0"/>
-                        </a:spcBef>
-                        <a:spcAft>
-                          <a:spcPts val="0"/>
-                        </a:spcAft>
-                        <a:buClrTx/>
-                        <a:buSzTx/>
-                        <a:buFontTx/>
-                        <a:buNone/>
-                        <a:tabLst/>
-                        <a:defRPr/>
-                      </a:pPr>
-                      <a:r>
-                        <a:rPr lang="en-US" sz="1400" dirty="0">
-                          <a:solidFill>
-                            <a:schemeClr val="tx1"/>
-                          </a:solidFill>
-                        </a:rPr>
-                        <a:t>Field4’s</a:t>
-                      </a:r>
-                      <a:r>
-                        <a:rPr lang="en-US" sz="1400" baseline="0" dirty="0">
-                          <a:solidFill>
-                            <a:schemeClr val="tx1"/>
-                          </a:solidFill>
-                        </a:rPr>
-                        <a:t> </a:t>
-                      </a:r>
-                      <a:r>
-                        <a:rPr lang="en-US" sz="1400" dirty="0">
-                          <a:solidFill>
-                            <a:schemeClr val="tx1"/>
-                          </a:solidFill>
-                        </a:rPr>
-                        <a:t>type</a:t>
-                      </a:r>
-                    </a:p>
-                  </a:txBody>
-                  <a:tcPr anchor="ctr">
-                    <a:solidFill>
-                      <a:schemeClr val="bg1">
-                        <a:lumMod val="95000"/>
-                      </a:schemeClr>
-                    </a:solidFill>
-                  </a:tcPr>
-                </a:tc>
-                <a:tc>
-                  <a:txBody>
-                    <a:bodyPr/>
-                    <a:lstStyle/>
-                    <a:p>
-                      <a:pPr marL="0" marR="0" indent="0" algn="ctr" defTabSz="914400" rtl="0" eaLnBrk="1" fontAlgn="auto" latinLnBrk="1" hangingPunct="1">
-                        <a:lnSpc>
-                          <a:spcPct val="100000"/>
-                        </a:lnSpc>
-                        <a:spcBef>
-                          <a:spcPts val="0"/>
-                        </a:spcBef>
-                        <a:spcAft>
-                          <a:spcPts val="0"/>
-                        </a:spcAft>
-                        <a:buClrTx/>
-                        <a:buSzTx/>
-                        <a:buFontTx/>
-                        <a:buNone/>
-                        <a:tabLst/>
-                        <a:defRPr/>
-                      </a:pPr>
-                      <a:r>
-                        <a:rPr lang="en-US" sz="1400" dirty="0">
-                          <a:solidFill>
-                            <a:schemeClr val="tx1"/>
-                          </a:solidFill>
-                        </a:rPr>
-                        <a:t>Field5’s</a:t>
-                      </a:r>
-                      <a:r>
-                        <a:rPr lang="en-US" sz="1400" baseline="0" dirty="0">
-                          <a:solidFill>
-                            <a:schemeClr val="tx1"/>
-                          </a:solidFill>
-                        </a:rPr>
-                        <a:t> </a:t>
-                      </a:r>
-                      <a:r>
-                        <a:rPr lang="en-US" sz="1400" dirty="0">
-                          <a:solidFill>
-                            <a:schemeClr val="tx1"/>
-                          </a:solidFill>
-                        </a:rPr>
-                        <a:t>type</a:t>
-                      </a:r>
-                    </a:p>
-                  </a:txBody>
-                  <a:tcPr anchor="ctr">
-                    <a:solidFill>
-                      <a:schemeClr val="bg1">
-                        <a:lumMod val="95000"/>
-                      </a:schemeClr>
-                    </a:solidFill>
-                  </a:tcPr>
-                </a:tc>
-                <a:tc>
-                  <a:txBody>
-                    <a:bodyPr/>
-                    <a:lstStyle/>
-                    <a:p>
-                      <a:pPr marL="0" marR="0" indent="0" algn="ctr" defTabSz="914400" rtl="0" eaLnBrk="1" fontAlgn="auto" latinLnBrk="1" hangingPunct="1">
-                        <a:lnSpc>
-                          <a:spcPct val="100000"/>
-                        </a:lnSpc>
-                        <a:spcBef>
-                          <a:spcPts val="0"/>
-                        </a:spcBef>
-                        <a:spcAft>
-                          <a:spcPts val="0"/>
-                        </a:spcAft>
-                        <a:buClrTx/>
-                        <a:buSzTx/>
-                        <a:buFontTx/>
-                        <a:buNone/>
-                        <a:tabLst/>
-                        <a:defRPr/>
-                      </a:pPr>
-                      <a:r>
-                        <a:rPr lang="en-US" sz="1400" dirty="0">
-                          <a:solidFill>
-                            <a:schemeClr val="tx1"/>
-                          </a:solidFill>
-                        </a:rPr>
-                        <a:t>Field6’s</a:t>
-                      </a:r>
-                      <a:r>
-                        <a:rPr lang="en-US" sz="1400" baseline="0" dirty="0">
-                          <a:solidFill>
-                            <a:schemeClr val="tx1"/>
-                          </a:solidFill>
-                        </a:rPr>
-                        <a:t> </a:t>
-                      </a:r>
-                      <a:r>
-                        <a:rPr lang="en-US" sz="1400" dirty="0">
-                          <a:solidFill>
-                            <a:schemeClr val="tx1"/>
-                          </a:solidFill>
-                        </a:rPr>
-                        <a:t>type</a:t>
-                      </a:r>
-                    </a:p>
-                  </a:txBody>
-                  <a:tcPr anchor="ctr">
-                    <a:solidFill>
-                      <a:schemeClr val="bg1">
-                        <a:lumMod val="95000"/>
-                      </a:schemeClr>
-                    </a:solidFill>
-                  </a:tcPr>
-                </a:tc>
-                <a:tc>
-                  <a:txBody>
-                    <a:bodyPr/>
-                    <a:lstStyle/>
-                    <a:p>
-                      <a:pPr marL="0" marR="0" indent="0" algn="ctr" defTabSz="914400" rtl="0" eaLnBrk="1" fontAlgn="auto" latinLnBrk="1" hangingPunct="1">
-                        <a:lnSpc>
-                          <a:spcPct val="100000"/>
-                        </a:lnSpc>
-                        <a:spcBef>
-                          <a:spcPts val="0"/>
-                        </a:spcBef>
-                        <a:spcAft>
-                          <a:spcPts val="0"/>
-                        </a:spcAft>
-                        <a:buClrTx/>
-                        <a:buSzTx/>
-                        <a:buFontTx/>
-                        <a:buNone/>
-                        <a:tabLst/>
-                        <a:defRPr/>
-                      </a:pPr>
-                      <a:r>
-                        <a:rPr lang="en-US" sz="1400" dirty="0">
-                          <a:solidFill>
-                            <a:schemeClr val="tx1"/>
-                          </a:solidFill>
-                        </a:rPr>
-                        <a:t>Field7’s</a:t>
-                      </a:r>
-                      <a:r>
-                        <a:rPr lang="en-US" sz="1400" baseline="0" dirty="0">
-                          <a:solidFill>
-                            <a:schemeClr val="tx1"/>
-                          </a:solidFill>
-                        </a:rPr>
-                        <a:t> </a:t>
-                      </a:r>
-                      <a:r>
-                        <a:rPr lang="en-US" sz="1400" dirty="0">
-                          <a:solidFill>
-                            <a:schemeClr val="tx1"/>
-                          </a:solidFill>
-                        </a:rPr>
-                        <a:t>type</a:t>
-                      </a:r>
-                    </a:p>
-                  </a:txBody>
-                  <a:tcPr anchor="ctr">
-                    <a:solidFill>
-                      <a:schemeClr val="bg1">
-                        <a:lumMod val="95000"/>
-                      </a:schemeClr>
-                    </a:solidFill>
-                  </a:tcPr>
-                </a:tc>
-                <a:tc>
-                  <a:txBody>
-                    <a:bodyPr/>
-                    <a:lstStyle/>
-                    <a:p>
-                      <a:pPr marL="0" marR="0" indent="0" algn="ctr" defTabSz="914400" rtl="0" eaLnBrk="1" fontAlgn="auto" latinLnBrk="1" hangingPunct="1">
-                        <a:lnSpc>
-                          <a:spcPct val="100000"/>
-                        </a:lnSpc>
-                        <a:spcBef>
-                          <a:spcPts val="0"/>
-                        </a:spcBef>
-                        <a:spcAft>
-                          <a:spcPts val="0"/>
-                        </a:spcAft>
-                        <a:buClrTx/>
-                        <a:buSzTx/>
-                        <a:buFontTx/>
-                        <a:buNone/>
-                        <a:tabLst/>
-                        <a:defRPr/>
-                      </a:pPr>
-                      <a:r>
-                        <a:rPr lang="en-US" sz="1400" dirty="0">
+                        <a:rPr lang="en-US" sz="1200" dirty="0">
                           <a:solidFill>
                             <a:schemeClr val="tx1"/>
                           </a:solidFill>
@@ -8197,29 +9479,550 @@
       </p:graphicFrame>
       <p:sp>
         <p:nvSpPr>
-          <p:cNvPr id="18" name="TextBox 17"/>
-          <p:cNvSpPr txBox="1"/>
+          <p:cNvPr id="19" name="직사각형 18"/>
+          <p:cNvSpPr/>
           <p:nvPr/>
         </p:nvSpPr>
         <p:spPr>
           <a:xfrm>
-            <a:off x="125763" y="108457"/>
-            <a:ext cx="2088232" cy="369332"/>
+            <a:off x="1403648" y="792332"/>
+            <a:ext cx="2034245" cy="674100"/>
           </a:xfrm>
           <a:prstGeom prst="rect">
             <a:avLst/>
           </a:prstGeom>
           <a:noFill/>
         </p:spPr>
+        <p:style>
+          <a:lnRef idx="2">
+            <a:schemeClr val="accent1">
+              <a:shade val="50000"/>
+            </a:schemeClr>
+          </a:lnRef>
+          <a:fillRef idx="1">
+            <a:schemeClr val="accent1"/>
+          </a:fillRef>
+          <a:effectRef idx="0">
+            <a:schemeClr val="accent1"/>
+          </a:effectRef>
+          <a:fontRef idx="minor">
+            <a:schemeClr val="lt1"/>
+          </a:fontRef>
+        </p:style>
+        <p:txBody>
+          <a:bodyPr rtlCol="0" anchor="ctr"/>
+          <a:lstStyle/>
+          <a:p>
+            <a:pPr algn="ctr"/>
+            <a:endParaRPr lang="en-US"/>
+          </a:p>
+        </p:txBody>
+      </p:sp>
+      <p:sp>
+        <p:nvSpPr>
+          <p:cNvPr id="20" name="TextBox 19"/>
+          <p:cNvSpPr txBox="1"/>
+          <p:nvPr/>
+        </p:nvSpPr>
+        <p:spPr>
+          <a:xfrm>
+            <a:off x="1845068" y="461646"/>
+            <a:ext cx="1385897" cy="307777"/>
+          </a:xfrm>
+          <a:prstGeom prst="rect">
+            <a:avLst/>
+          </a:prstGeom>
+          <a:noFill/>
+        </p:spPr>
         <p:txBody>
           <a:bodyPr wrap="square" rtlCol="0">
             <a:spAutoFit/>
           </a:bodyPr>
           <a:lstStyle/>
           <a:p>
-            <a:r>
-              <a:rPr lang="en-US" b="1" dirty="0"/>
+            <a:pPr algn="ctr"/>
+            <a:r>
+              <a:rPr lang="en-US" sz="1400" dirty="0"/>
               <a:t>Table.java</a:t>
+            </a:r>
+          </a:p>
+        </p:txBody>
+      </p:sp>
+      <p:sp>
+        <p:nvSpPr>
+          <p:cNvPr id="21" name="TextBox 20"/>
+          <p:cNvSpPr txBox="1"/>
+          <p:nvPr/>
+        </p:nvSpPr>
+        <p:spPr>
+          <a:xfrm>
+            <a:off x="1403648" y="806217"/>
+            <a:ext cx="2114865" cy="646331"/>
+          </a:xfrm>
+          <a:prstGeom prst="rect">
+            <a:avLst/>
+          </a:prstGeom>
+          <a:noFill/>
+        </p:spPr>
+        <p:txBody>
+          <a:bodyPr wrap="square" rtlCol="0">
+            <a:spAutoFit/>
+          </a:bodyPr>
+          <a:lstStyle/>
+          <a:p>
+            <a:pPr algn="ctr"/>
+            <a:r>
+              <a:rPr lang="en-US" sz="1200" dirty="0"/>
+              <a:t>String </a:t>
+            </a:r>
+            <a:r>
+              <a:rPr lang="en-US" sz="1200" dirty="0" err="1"/>
+              <a:t>tableName</a:t>
+            </a:r>
+            <a:r>
+              <a:rPr lang="en-US" sz="1200" dirty="0"/>
+              <a:t>;</a:t>
+            </a:r>
+          </a:p>
+          <a:p>
+            <a:pPr algn="ctr"/>
+            <a:r>
+              <a:rPr lang="en-US" sz="1200" dirty="0"/>
+              <a:t>ArrayList&lt;Record&gt; alTable;</a:t>
+            </a:r>
+          </a:p>
+          <a:p>
+            <a:pPr algn="ctr"/>
+            <a:r>
+              <a:rPr lang="en-US" sz="1200" dirty="0">
+                <a:solidFill>
+                  <a:prstClr val="black"/>
+                </a:solidFill>
+              </a:rPr>
+              <a:t>ArrayList&lt;Field&gt; alField;</a:t>
+            </a:r>
+          </a:p>
+        </p:txBody>
+      </p:sp>
+      <p:sp>
+        <p:nvSpPr>
+          <p:cNvPr id="22" name="직사각형 21"/>
+          <p:cNvSpPr/>
+          <p:nvPr/>
+        </p:nvSpPr>
+        <p:spPr>
+          <a:xfrm>
+            <a:off x="3594960" y="830638"/>
+            <a:ext cx="1908207" cy="597489"/>
+          </a:xfrm>
+          <a:prstGeom prst="rect">
+            <a:avLst/>
+          </a:prstGeom>
+          <a:noFill/>
+        </p:spPr>
+        <p:style>
+          <a:lnRef idx="2">
+            <a:schemeClr val="accent1">
+              <a:shade val="50000"/>
+            </a:schemeClr>
+          </a:lnRef>
+          <a:fillRef idx="1">
+            <a:schemeClr val="accent1"/>
+          </a:fillRef>
+          <a:effectRef idx="0">
+            <a:schemeClr val="accent1"/>
+          </a:effectRef>
+          <a:fontRef idx="minor">
+            <a:schemeClr val="lt1"/>
+          </a:fontRef>
+        </p:style>
+        <p:txBody>
+          <a:bodyPr rtlCol="0" anchor="ctr"/>
+          <a:lstStyle/>
+          <a:p>
+            <a:pPr algn="ctr"/>
+            <a:endParaRPr lang="en-US"/>
+          </a:p>
+        </p:txBody>
+      </p:sp>
+      <p:sp>
+        <p:nvSpPr>
+          <p:cNvPr id="23" name="TextBox 22"/>
+          <p:cNvSpPr txBox="1"/>
+          <p:nvPr/>
+        </p:nvSpPr>
+        <p:spPr>
+          <a:xfrm>
+            <a:off x="3882992" y="461646"/>
+            <a:ext cx="1385897" cy="307777"/>
+          </a:xfrm>
+          <a:prstGeom prst="rect">
+            <a:avLst/>
+          </a:prstGeom>
+          <a:noFill/>
+        </p:spPr>
+        <p:txBody>
+          <a:bodyPr wrap="square" rtlCol="0">
+            <a:spAutoFit/>
+          </a:bodyPr>
+          <a:lstStyle/>
+          <a:p>
+            <a:pPr algn="ctr"/>
+            <a:r>
+              <a:rPr lang="en-US" sz="1400" dirty="0"/>
+              <a:t>Record.java</a:t>
+            </a:r>
+          </a:p>
+        </p:txBody>
+      </p:sp>
+      <p:sp>
+        <p:nvSpPr>
+          <p:cNvPr id="24" name="TextBox 23"/>
+          <p:cNvSpPr txBox="1"/>
+          <p:nvPr/>
+        </p:nvSpPr>
+        <p:spPr>
+          <a:xfrm>
+            <a:off x="3594960" y="990883"/>
+            <a:ext cx="1917582" cy="276999"/>
+          </a:xfrm>
+          <a:prstGeom prst="rect">
+            <a:avLst/>
+          </a:prstGeom>
+          <a:noFill/>
+        </p:spPr>
+        <p:txBody>
+          <a:bodyPr wrap="square" rtlCol="0">
+            <a:spAutoFit/>
+          </a:bodyPr>
+          <a:lstStyle/>
+          <a:p>
+            <a:pPr algn="ctr"/>
+            <a:r>
+              <a:rPr lang="en-US" sz="1200" dirty="0" err="1"/>
+              <a:t>ArrayList</a:t>
+            </a:r>
+            <a:r>
+              <a:rPr lang="en-US" sz="1200" dirty="0"/>
+              <a:t>&lt;Value&gt; record;</a:t>
+            </a:r>
+            <a:endParaRPr lang="en-US" sz="1200" dirty="0">
+              <a:solidFill>
+                <a:prstClr val="black"/>
+              </a:solidFill>
+            </a:endParaRPr>
+          </a:p>
+        </p:txBody>
+      </p:sp>
+      <p:sp>
+        <p:nvSpPr>
+          <p:cNvPr id="25" name="직사각형 24"/>
+          <p:cNvSpPr/>
+          <p:nvPr/>
+        </p:nvSpPr>
+        <p:spPr>
+          <a:xfrm>
+            <a:off x="5683192" y="830638"/>
+            <a:ext cx="1908207" cy="597489"/>
+          </a:xfrm>
+          <a:prstGeom prst="rect">
+            <a:avLst/>
+          </a:prstGeom>
+          <a:noFill/>
+        </p:spPr>
+        <p:style>
+          <a:lnRef idx="2">
+            <a:schemeClr val="accent1">
+              <a:shade val="50000"/>
+            </a:schemeClr>
+          </a:lnRef>
+          <a:fillRef idx="1">
+            <a:schemeClr val="accent1"/>
+          </a:fillRef>
+          <a:effectRef idx="0">
+            <a:schemeClr val="accent1"/>
+          </a:effectRef>
+          <a:fontRef idx="minor">
+            <a:schemeClr val="lt1"/>
+          </a:fontRef>
+        </p:style>
+        <p:txBody>
+          <a:bodyPr rtlCol="0" anchor="ctr"/>
+          <a:lstStyle/>
+          <a:p>
+            <a:pPr algn="ctr"/>
+            <a:endParaRPr lang="en-US"/>
+          </a:p>
+        </p:txBody>
+      </p:sp>
+      <p:sp>
+        <p:nvSpPr>
+          <p:cNvPr id="26" name="TextBox 25"/>
+          <p:cNvSpPr txBox="1"/>
+          <p:nvPr/>
+        </p:nvSpPr>
+        <p:spPr>
+          <a:xfrm>
+            <a:off x="5971224" y="461646"/>
+            <a:ext cx="1385897" cy="307777"/>
+          </a:xfrm>
+          <a:prstGeom prst="rect">
+            <a:avLst/>
+          </a:prstGeom>
+          <a:noFill/>
+        </p:spPr>
+        <p:txBody>
+          <a:bodyPr wrap="square" rtlCol="0">
+            <a:spAutoFit/>
+          </a:bodyPr>
+          <a:lstStyle/>
+          <a:p>
+            <a:pPr algn="ctr"/>
+            <a:r>
+              <a:rPr lang="en-US" sz="1400" dirty="0"/>
+              <a:t>Value.java</a:t>
+            </a:r>
+          </a:p>
+        </p:txBody>
+      </p:sp>
+      <p:sp>
+        <p:nvSpPr>
+          <p:cNvPr id="27" name="TextBox 26"/>
+          <p:cNvSpPr txBox="1"/>
+          <p:nvPr/>
+        </p:nvSpPr>
+        <p:spPr>
+          <a:xfrm>
+            <a:off x="5683192" y="836995"/>
+            <a:ext cx="1917582" cy="584775"/>
+          </a:xfrm>
+          <a:prstGeom prst="rect">
+            <a:avLst/>
+          </a:prstGeom>
+          <a:noFill/>
+        </p:spPr>
+        <p:txBody>
+          <a:bodyPr wrap="square" rtlCol="0">
+            <a:spAutoFit/>
+          </a:bodyPr>
+          <a:lstStyle/>
+          <a:p>
+            <a:pPr algn="ctr"/>
+            <a:r>
+              <a:rPr lang="en-US" sz="1200" dirty="0"/>
+              <a:t>Field field;</a:t>
+            </a:r>
+          </a:p>
+          <a:p>
+            <a:pPr algn="ctr"/>
+            <a:r>
+              <a:rPr lang="en-US" sz="1200" dirty="0">
+                <a:solidFill>
+                  <a:prstClr val="black"/>
+                </a:solidFill>
+              </a:rPr>
+              <a:t>T data;</a:t>
+            </a:r>
+          </a:p>
+          <a:p>
+            <a:pPr algn="ctr"/>
+            <a:r>
+              <a:rPr lang="en-US" sz="800" dirty="0">
+                <a:solidFill>
+                  <a:prstClr val="black"/>
+                </a:solidFill>
+              </a:rPr>
+              <a:t>&lt;T extends Comparable&lt;T&gt;&gt;</a:t>
+            </a:r>
+          </a:p>
+        </p:txBody>
+      </p:sp>
+      <p:sp>
+        <p:nvSpPr>
+          <p:cNvPr id="28" name="직사각형 27"/>
+          <p:cNvSpPr/>
+          <p:nvPr/>
+        </p:nvSpPr>
+        <p:spPr>
+          <a:xfrm>
+            <a:off x="2411758" y="1539036"/>
+            <a:ext cx="5189015" cy="658350"/>
+          </a:xfrm>
+          <a:prstGeom prst="rect">
+            <a:avLst/>
+          </a:prstGeom>
+          <a:noFill/>
+        </p:spPr>
+        <p:style>
+          <a:lnRef idx="2">
+            <a:schemeClr val="accent1">
+              <a:shade val="50000"/>
+            </a:schemeClr>
+          </a:lnRef>
+          <a:fillRef idx="1">
+            <a:schemeClr val="accent1"/>
+          </a:fillRef>
+          <a:effectRef idx="0">
+            <a:schemeClr val="accent1"/>
+          </a:effectRef>
+          <a:fontRef idx="minor">
+            <a:schemeClr val="lt1"/>
+          </a:fontRef>
+        </p:style>
+        <p:txBody>
+          <a:bodyPr rtlCol="0" anchor="ctr"/>
+          <a:lstStyle/>
+          <a:p>
+            <a:pPr algn="ctr"/>
+            <a:endParaRPr lang="en-US"/>
+          </a:p>
+        </p:txBody>
+      </p:sp>
+      <p:sp>
+        <p:nvSpPr>
+          <p:cNvPr id="29" name="TextBox 28"/>
+          <p:cNvSpPr txBox="1"/>
+          <p:nvPr/>
+        </p:nvSpPr>
+        <p:spPr>
+          <a:xfrm>
+            <a:off x="1403648" y="1686276"/>
+            <a:ext cx="934529" cy="307777"/>
+          </a:xfrm>
+          <a:prstGeom prst="rect">
+            <a:avLst/>
+          </a:prstGeom>
+          <a:noFill/>
+        </p:spPr>
+        <p:txBody>
+          <a:bodyPr wrap="square" rtlCol="0">
+            <a:spAutoFit/>
+          </a:bodyPr>
+          <a:lstStyle/>
+          <a:p>
+            <a:pPr algn="ctr"/>
+            <a:r>
+              <a:rPr lang="en-US" sz="1400" dirty="0"/>
+              <a:t>Field.java</a:t>
+            </a:r>
+          </a:p>
+        </p:txBody>
+      </p:sp>
+      <p:sp>
+        <p:nvSpPr>
+          <p:cNvPr id="30" name="TextBox 29"/>
+          <p:cNvSpPr txBox="1"/>
+          <p:nvPr/>
+        </p:nvSpPr>
+        <p:spPr>
+          <a:xfrm>
+            <a:off x="2411759" y="1539036"/>
+            <a:ext cx="5112569" cy="646331"/>
+          </a:xfrm>
+          <a:prstGeom prst="rect">
+            <a:avLst/>
+          </a:prstGeom>
+          <a:noFill/>
+        </p:spPr>
+        <p:txBody>
+          <a:bodyPr wrap="square" rtlCol="0">
+            <a:spAutoFit/>
+          </a:bodyPr>
+          <a:lstStyle/>
+          <a:p>
+            <a:pPr algn="ctr"/>
+            <a:r>
+              <a:rPr lang="en-US" sz="1200" dirty="0"/>
+              <a:t>public </a:t>
+            </a:r>
+            <a:r>
+              <a:rPr lang="en-US" sz="1200" dirty="0" err="1"/>
+              <a:t>enum</a:t>
+            </a:r>
+            <a:r>
+              <a:rPr lang="en-US" sz="1200" dirty="0"/>
+              <a:t> TYPE {INTEGER,VARCHAR,FLOAT,DATE };</a:t>
+            </a:r>
+            <a:endParaRPr lang="en-US" sz="800" dirty="0"/>
+          </a:p>
+          <a:p>
+            <a:pPr algn="ctr"/>
+            <a:r>
+              <a:rPr lang="en-US" sz="1200" dirty="0"/>
+              <a:t>TYPE </a:t>
+            </a:r>
+            <a:r>
+              <a:rPr lang="en-US" sz="1200" dirty="0" err="1"/>
+              <a:t>fType</a:t>
+            </a:r>
+            <a:r>
+              <a:rPr lang="en-US" sz="1200" dirty="0"/>
+              <a:t>;</a:t>
+            </a:r>
+          </a:p>
+          <a:p>
+            <a:pPr algn="ctr"/>
+            <a:r>
+              <a:rPr lang="en-US" sz="1200" dirty="0"/>
+              <a:t>String </a:t>
+            </a:r>
+            <a:r>
+              <a:rPr lang="en-US" sz="1200" dirty="0" err="1"/>
+              <a:t>fName</a:t>
+            </a:r>
+            <a:r>
+              <a:rPr lang="en-US" sz="1200" dirty="0"/>
+              <a:t>;</a:t>
+            </a:r>
+            <a:endParaRPr lang="en-US" sz="1200" dirty="0">
+              <a:solidFill>
+                <a:prstClr val="black"/>
+              </a:solidFill>
+            </a:endParaRPr>
+          </a:p>
+        </p:txBody>
+      </p:sp>
+      <p:sp>
+        <p:nvSpPr>
+          <p:cNvPr id="3" name="TextBox 2"/>
+          <p:cNvSpPr txBox="1"/>
+          <p:nvPr/>
+        </p:nvSpPr>
+        <p:spPr>
+          <a:xfrm>
+            <a:off x="1475656" y="4705980"/>
+            <a:ext cx="7291517" cy="523220"/>
+          </a:xfrm>
+          <a:prstGeom prst="rect">
+            <a:avLst/>
+          </a:prstGeom>
+          <a:noFill/>
+        </p:spPr>
+        <p:txBody>
+          <a:bodyPr wrap="square" rtlCol="0">
+            <a:spAutoFit/>
+          </a:bodyPr>
+          <a:lstStyle/>
+          <a:p>
+            <a:pPr algn="r"/>
+            <a:r>
+              <a:rPr lang="en-US" sz="1400" dirty="0">
+                <a:solidFill>
+                  <a:srgbClr val="FF0000"/>
+                </a:solidFill>
+              </a:rPr>
+              <a:t>Current Assumption : Record has no order for value</a:t>
+            </a:r>
+          </a:p>
+          <a:p>
+            <a:pPr algn="r"/>
+            <a:r>
+              <a:rPr lang="en-US" sz="1400" dirty="0">
+                <a:solidFill>
+                  <a:srgbClr val="FF0000"/>
+                </a:solidFill>
+              </a:rPr>
+              <a:t>Display need to care about record value which can be exist or not, and no order</a:t>
             </a:r>
           </a:p>
         </p:txBody>

</xml_diff>

<commit_message>
I added new method to create table and add rows more conveniently. please check example code on Controller.java Also, This code keeps data same position according to table's filed table. (This is done while I fix the issue that we can add same data type in same row).
</commit_message>
<xml_diff>
--- a/doc/Design.pptx
+++ b/doc/Design.pptx
@@ -304,7 +304,7 @@
           <a:p>
             <a:fld id="{FB30EDBD-1C2D-4C1E-B459-B60219FAB484}" type="datetimeFigureOut">
               <a:rPr lang="ko-KR" altLang="en-US" smtClean="0"/>
-              <a:t>2016-06-14</a:t>
+              <a:t>2016-06-28</a:t>
             </a:fld>
             <a:endParaRPr lang="ko-KR" altLang="en-US"/>
           </a:p>
@@ -467,7 +467,7 @@
           <a:p>
             <a:fld id="{FB30EDBD-1C2D-4C1E-B459-B60219FAB484}" type="datetimeFigureOut">
               <a:rPr lang="ko-KR" altLang="en-US" smtClean="0"/>
-              <a:t>2016-06-14</a:t>
+              <a:t>2016-06-28</a:t>
             </a:fld>
             <a:endParaRPr lang="ko-KR" altLang="en-US"/>
           </a:p>
@@ -640,7 +640,7 @@
           <a:p>
             <a:fld id="{FB30EDBD-1C2D-4C1E-B459-B60219FAB484}" type="datetimeFigureOut">
               <a:rPr lang="ko-KR" altLang="en-US" smtClean="0"/>
-              <a:t>2016-06-14</a:t>
+              <a:t>2016-06-28</a:t>
             </a:fld>
             <a:endParaRPr lang="ko-KR" altLang="en-US"/>
           </a:p>
@@ -803,7 +803,7 @@
           <a:p>
             <a:fld id="{FB30EDBD-1C2D-4C1E-B459-B60219FAB484}" type="datetimeFigureOut">
               <a:rPr lang="ko-KR" altLang="en-US" smtClean="0"/>
-              <a:t>2016-06-14</a:t>
+              <a:t>2016-06-28</a:t>
             </a:fld>
             <a:endParaRPr lang="ko-KR" altLang="en-US"/>
           </a:p>
@@ -1043,7 +1043,7 @@
           <a:p>
             <a:fld id="{FB30EDBD-1C2D-4C1E-B459-B60219FAB484}" type="datetimeFigureOut">
               <a:rPr lang="ko-KR" altLang="en-US" smtClean="0"/>
-              <a:t>2016-06-14</a:t>
+              <a:t>2016-06-28</a:t>
             </a:fld>
             <a:endParaRPr lang="ko-KR" altLang="en-US"/>
           </a:p>
@@ -1323,7 +1323,7 @@
           <a:p>
             <a:fld id="{FB30EDBD-1C2D-4C1E-B459-B60219FAB484}" type="datetimeFigureOut">
               <a:rPr lang="ko-KR" altLang="en-US" smtClean="0"/>
-              <a:t>2016-06-14</a:t>
+              <a:t>2016-06-28</a:t>
             </a:fld>
             <a:endParaRPr lang="ko-KR" altLang="en-US"/>
           </a:p>
@@ -1737,7 +1737,7 @@
           <a:p>
             <a:fld id="{FB30EDBD-1C2D-4C1E-B459-B60219FAB484}" type="datetimeFigureOut">
               <a:rPr lang="ko-KR" altLang="en-US" smtClean="0"/>
-              <a:t>2016-06-14</a:t>
+              <a:t>2016-06-28</a:t>
             </a:fld>
             <a:endParaRPr lang="ko-KR" altLang="en-US"/>
           </a:p>
@@ -1849,7 +1849,7 @@
           <a:p>
             <a:fld id="{FB30EDBD-1C2D-4C1E-B459-B60219FAB484}" type="datetimeFigureOut">
               <a:rPr lang="ko-KR" altLang="en-US" smtClean="0"/>
-              <a:t>2016-06-14</a:t>
+              <a:t>2016-06-28</a:t>
             </a:fld>
             <a:endParaRPr lang="ko-KR" altLang="en-US"/>
           </a:p>
@@ -1939,7 +1939,7 @@
           <a:p>
             <a:fld id="{FB30EDBD-1C2D-4C1E-B459-B60219FAB484}" type="datetimeFigureOut">
               <a:rPr lang="ko-KR" altLang="en-US" smtClean="0"/>
-              <a:t>2016-06-14</a:t>
+              <a:t>2016-06-28</a:t>
             </a:fld>
             <a:endParaRPr lang="ko-KR" altLang="en-US"/>
           </a:p>
@@ -2209,7 +2209,7 @@
           <a:p>
             <a:fld id="{FB30EDBD-1C2D-4C1E-B459-B60219FAB484}" type="datetimeFigureOut">
               <a:rPr lang="ko-KR" altLang="en-US" smtClean="0"/>
-              <a:t>2016-06-14</a:t>
+              <a:t>2016-06-28</a:t>
             </a:fld>
             <a:endParaRPr lang="ko-KR" altLang="en-US"/>
           </a:p>
@@ -2456,7 +2456,7 @@
           <a:p>
             <a:fld id="{FB30EDBD-1C2D-4C1E-B459-B60219FAB484}" type="datetimeFigureOut">
               <a:rPr lang="ko-KR" altLang="en-US" smtClean="0"/>
-              <a:t>2016-06-14</a:t>
+              <a:t>2016-06-28</a:t>
             </a:fld>
             <a:endParaRPr lang="ko-KR" altLang="en-US"/>
           </a:p>
@@ -2662,7 +2662,7 @@
           <a:p>
             <a:fld id="{FB30EDBD-1C2D-4C1E-B459-B60219FAB484}" type="datetimeFigureOut">
               <a:rPr lang="ko-KR" altLang="en-US" smtClean="0"/>
-              <a:t>2016-06-14</a:t>
+              <a:t>2016-06-28</a:t>
             </a:fld>
             <a:endParaRPr lang="ko-KR" altLang="en-US"/>
           </a:p>
@@ -9485,7 +9485,7 @@
         </p:nvSpPr>
         <p:spPr>
           <a:xfrm>
-            <a:off x="1403648" y="792332"/>
+            <a:off x="1403648" y="591334"/>
             <a:ext cx="2034245" cy="674100"/>
           </a:xfrm>
           <a:prstGeom prst="rect">
@@ -9526,7 +9526,7 @@
         </p:nvSpPr>
         <p:spPr>
           <a:xfrm>
-            <a:off x="1845068" y="461646"/>
+            <a:off x="1845068" y="260648"/>
             <a:ext cx="1385897" cy="307777"/>
           </a:xfrm>
           <a:prstGeom prst="rect">
@@ -9556,7 +9556,7 @@
         </p:nvSpPr>
         <p:spPr>
           <a:xfrm>
-            <a:off x="1403648" y="806217"/>
+            <a:off x="1403648" y="605219"/>
             <a:ext cx="2114865" cy="646331"/>
           </a:xfrm>
           <a:prstGeom prst="rect">
@@ -9612,7 +9612,7 @@
         </p:nvSpPr>
         <p:spPr>
           <a:xfrm>
-            <a:off x="3594960" y="830638"/>
+            <a:off x="3594960" y="629640"/>
             <a:ext cx="1908207" cy="597489"/>
           </a:xfrm>
           <a:prstGeom prst="rect">
@@ -9653,7 +9653,7 @@
         </p:nvSpPr>
         <p:spPr>
           <a:xfrm>
-            <a:off x="3882992" y="461646"/>
+            <a:off x="3882992" y="260648"/>
             <a:ext cx="1385897" cy="307777"/>
           </a:xfrm>
           <a:prstGeom prst="rect">
@@ -9683,7 +9683,7 @@
         </p:nvSpPr>
         <p:spPr>
           <a:xfrm>
-            <a:off x="3594960" y="990883"/>
+            <a:off x="3594960" y="789885"/>
             <a:ext cx="1917582" cy="276999"/>
           </a:xfrm>
           <a:prstGeom prst="rect">
@@ -9722,7 +9722,7 @@
         </p:nvSpPr>
         <p:spPr>
           <a:xfrm>
-            <a:off x="5683192" y="830638"/>
+            <a:off x="5683192" y="629640"/>
             <a:ext cx="1908207" cy="597489"/>
           </a:xfrm>
           <a:prstGeom prst="rect">
@@ -9763,7 +9763,7 @@
         </p:nvSpPr>
         <p:spPr>
           <a:xfrm>
-            <a:off x="5971224" y="461646"/>
+            <a:off x="5971224" y="260648"/>
             <a:ext cx="1385897" cy="307777"/>
           </a:xfrm>
           <a:prstGeom prst="rect">
@@ -9793,7 +9793,7 @@
         </p:nvSpPr>
         <p:spPr>
           <a:xfrm>
-            <a:off x="5683192" y="836995"/>
+            <a:off x="5683192" y="635997"/>
             <a:ext cx="1917582" cy="584775"/>
           </a:xfrm>
           <a:prstGeom prst="rect">
@@ -9845,8 +9845,8 @@
         </p:nvSpPr>
         <p:spPr>
           <a:xfrm>
-            <a:off x="2411758" y="1539036"/>
-            <a:ext cx="5189015" cy="658350"/>
+            <a:off x="2411758" y="1338038"/>
+            <a:ext cx="5189015" cy="863960"/>
           </a:xfrm>
           <a:prstGeom prst="rect">
             <a:avLst/>
@@ -9886,7 +9886,7 @@
         </p:nvSpPr>
         <p:spPr>
           <a:xfrm>
-            <a:off x="1403648" y="1686276"/>
+            <a:off x="1403648" y="1485278"/>
             <a:ext cx="934529" cy="307777"/>
           </a:xfrm>
           <a:prstGeom prst="rect">
@@ -9916,8 +9916,8 @@
         </p:nvSpPr>
         <p:spPr>
           <a:xfrm>
-            <a:off x="2411759" y="1539036"/>
-            <a:ext cx="5112569" cy="646331"/>
+            <a:off x="2411759" y="1338038"/>
+            <a:ext cx="5112569" cy="830997"/>
           </a:xfrm>
           <a:prstGeom prst="rect">
             <a:avLst/>
@@ -9942,6 +9942,21 @@
             <a:r>
               <a:rPr lang="en-US" sz="1200" dirty="0"/>
               <a:t> TYPE {INTEGER,VARCHAR,FLOAT,DATE };</a:t>
+            </a:r>
+          </a:p>
+          <a:p>
+            <a:pPr algn="ctr"/>
+            <a:r>
+              <a:rPr lang="en-US" sz="1200" dirty="0"/>
+              <a:t>public </a:t>
+            </a:r>
+            <a:r>
+              <a:rPr lang="en-US" sz="1200" dirty="0" err="1"/>
+              <a:t>enum</a:t>
+            </a:r>
+            <a:r>
+              <a:rPr lang="en-US" sz="1200" dirty="0"/>
+              <a:t> KEY {PRIMARY, FOREIGN, NORMAL };</a:t>
             </a:r>
             <a:endParaRPr lang="en-US" sz="800" dirty="0"/>
           </a:p>

</xml_diff>

<commit_message>
Add "LIKE" command, add Search Exception
</commit_message>
<xml_diff>
--- a/doc/Design.pptx
+++ b/doc/Design.pptx
@@ -9704,7 +9704,19 @@
             </a:r>
             <a:r>
               <a:rPr lang="en-US" sz="1200" dirty="0"/>
-              <a:t>&lt;Value&gt; record;</a:t>
+              <a:t>&lt;</a:t>
+            </a:r>
+            <a:r>
+              <a:rPr lang="en-US" sz="1200" dirty="0">
+                <a:solidFill>
+                  <a:schemeClr val="accent6"/>
+                </a:solidFill>
+              </a:rPr>
+              <a:t>Value</a:t>
+            </a:r>
+            <a:r>
+              <a:rPr lang="en-US" sz="1200" dirty="0"/>
+              <a:t>&gt; record;</a:t>
             </a:r>
             <a:endParaRPr lang="en-US" sz="1200" dirty="0">
               <a:solidFill>
@@ -9779,7 +9791,11 @@
           <a:p>
             <a:pPr algn="ctr"/>
             <a:r>
-              <a:rPr lang="en-US" sz="1400" dirty="0"/>
+              <a:rPr lang="en-US" sz="1400" dirty="0">
+                <a:solidFill>
+                  <a:schemeClr val="accent6"/>
+                </a:solidFill>
+              </a:rPr>
               <a:t>Value.java</a:t>
             </a:r>
           </a:p>
@@ -9809,7 +9825,11 @@
           <a:p>
             <a:pPr algn="ctr"/>
             <a:r>
-              <a:rPr lang="en-US" sz="1200" dirty="0"/>
+              <a:rPr lang="en-US" sz="1200" dirty="0">
+                <a:solidFill>
+                  <a:schemeClr val="accent5"/>
+                </a:solidFill>
+              </a:rPr>
               <a:t>Field field;</a:t>
             </a:r>
           </a:p>
@@ -9902,7 +9922,11 @@
           <a:p>
             <a:pPr algn="ctr"/>
             <a:r>
-              <a:rPr lang="en-US" sz="1400" dirty="0"/>
+              <a:rPr lang="en-US" sz="1400" dirty="0">
+                <a:solidFill>
+                  <a:schemeClr val="accent5"/>
+                </a:solidFill>
+              </a:rPr>
               <a:t>Field.java</a:t>
             </a:r>
           </a:p>
@@ -9994,51 +10018,6 @@
                 <a:prstClr val="black"/>
               </a:solidFill>
             </a:endParaRPr>
-          </a:p>
-        </p:txBody>
-      </p:sp>
-      <p:sp>
-        <p:nvSpPr>
-          <p:cNvPr id="3" name="TextBox 2"/>
-          <p:cNvSpPr txBox="1"/>
-          <p:nvPr/>
-        </p:nvSpPr>
-        <p:spPr>
-          <a:xfrm>
-            <a:off x="1475656" y="4705980"/>
-            <a:ext cx="7291517" cy="523220"/>
-          </a:xfrm>
-          <a:prstGeom prst="rect">
-            <a:avLst/>
-          </a:prstGeom>
-          <a:noFill/>
-        </p:spPr>
-        <p:txBody>
-          <a:bodyPr wrap="square" rtlCol="0">
-            <a:spAutoFit/>
-          </a:bodyPr>
-          <a:lstStyle/>
-          <a:p>
-            <a:pPr algn="r"/>
-            <a:r>
-              <a:rPr lang="en-US" sz="1400" dirty="0">
-                <a:solidFill>
-                  <a:srgbClr val="FF0000"/>
-                </a:solidFill>
-              </a:rPr>
-              <a:t>Current Assumption : Record has no order for value</a:t>
-            </a:r>
-          </a:p>
-          <a:p>
-            <a:pPr algn="r"/>
-            <a:r>
-              <a:rPr lang="en-US" sz="1400" dirty="0">
-                <a:solidFill>
-                  <a:srgbClr val="FF0000"/>
-                </a:solidFill>
-              </a:rPr>
-              <a:t>Display need to care about record value which can be exist or not, and no order</a:t>
-            </a:r>
           </a:p>
         </p:txBody>
       </p:sp>

</xml_diff>

<commit_message>
Implement basic select function
</commit_message>
<xml_diff>
--- a/doc/Design.pptx
+++ b/doc/Design.pptx
@@ -305,7 +305,7 @@
           <a:p>
             <a:fld id="{FB30EDBD-1C2D-4C1E-B459-B60219FAB484}" type="datetimeFigureOut">
               <a:rPr lang="ko-KR" altLang="en-US" smtClean="0"/>
-              <a:t>2016-07-06</a:t>
+              <a:t>2016-07-20</a:t>
             </a:fld>
             <a:endParaRPr lang="ko-KR" altLang="en-US"/>
           </a:p>
@@ -468,7 +468,7 @@
           <a:p>
             <a:fld id="{FB30EDBD-1C2D-4C1E-B459-B60219FAB484}" type="datetimeFigureOut">
               <a:rPr lang="ko-KR" altLang="en-US" smtClean="0"/>
-              <a:t>2016-07-06</a:t>
+              <a:t>2016-07-20</a:t>
             </a:fld>
             <a:endParaRPr lang="ko-KR" altLang="en-US"/>
           </a:p>
@@ -641,7 +641,7 @@
           <a:p>
             <a:fld id="{FB30EDBD-1C2D-4C1E-B459-B60219FAB484}" type="datetimeFigureOut">
               <a:rPr lang="ko-KR" altLang="en-US" smtClean="0"/>
-              <a:t>2016-07-06</a:t>
+              <a:t>2016-07-20</a:t>
             </a:fld>
             <a:endParaRPr lang="ko-KR" altLang="en-US"/>
           </a:p>
@@ -804,7 +804,7 @@
           <a:p>
             <a:fld id="{FB30EDBD-1C2D-4C1E-B459-B60219FAB484}" type="datetimeFigureOut">
               <a:rPr lang="ko-KR" altLang="en-US" smtClean="0"/>
-              <a:t>2016-07-06</a:t>
+              <a:t>2016-07-20</a:t>
             </a:fld>
             <a:endParaRPr lang="ko-KR" altLang="en-US"/>
           </a:p>
@@ -1044,7 +1044,7 @@
           <a:p>
             <a:fld id="{FB30EDBD-1C2D-4C1E-B459-B60219FAB484}" type="datetimeFigureOut">
               <a:rPr lang="ko-KR" altLang="en-US" smtClean="0"/>
-              <a:t>2016-07-06</a:t>
+              <a:t>2016-07-20</a:t>
             </a:fld>
             <a:endParaRPr lang="ko-KR" altLang="en-US"/>
           </a:p>
@@ -1324,7 +1324,7 @@
           <a:p>
             <a:fld id="{FB30EDBD-1C2D-4C1E-B459-B60219FAB484}" type="datetimeFigureOut">
               <a:rPr lang="ko-KR" altLang="en-US" smtClean="0"/>
-              <a:t>2016-07-06</a:t>
+              <a:t>2016-07-20</a:t>
             </a:fld>
             <a:endParaRPr lang="ko-KR" altLang="en-US"/>
           </a:p>
@@ -1738,7 +1738,7 @@
           <a:p>
             <a:fld id="{FB30EDBD-1C2D-4C1E-B459-B60219FAB484}" type="datetimeFigureOut">
               <a:rPr lang="ko-KR" altLang="en-US" smtClean="0"/>
-              <a:t>2016-07-06</a:t>
+              <a:t>2016-07-20</a:t>
             </a:fld>
             <a:endParaRPr lang="ko-KR" altLang="en-US"/>
           </a:p>
@@ -1850,7 +1850,7 @@
           <a:p>
             <a:fld id="{FB30EDBD-1C2D-4C1E-B459-B60219FAB484}" type="datetimeFigureOut">
               <a:rPr lang="ko-KR" altLang="en-US" smtClean="0"/>
-              <a:t>2016-07-06</a:t>
+              <a:t>2016-07-20</a:t>
             </a:fld>
             <a:endParaRPr lang="ko-KR" altLang="en-US"/>
           </a:p>
@@ -1940,7 +1940,7 @@
           <a:p>
             <a:fld id="{FB30EDBD-1C2D-4C1E-B459-B60219FAB484}" type="datetimeFigureOut">
               <a:rPr lang="ko-KR" altLang="en-US" smtClean="0"/>
-              <a:t>2016-07-06</a:t>
+              <a:t>2016-07-20</a:t>
             </a:fld>
             <a:endParaRPr lang="ko-KR" altLang="en-US"/>
           </a:p>
@@ -2210,7 +2210,7 @@
           <a:p>
             <a:fld id="{FB30EDBD-1C2D-4C1E-B459-B60219FAB484}" type="datetimeFigureOut">
               <a:rPr lang="ko-KR" altLang="en-US" smtClean="0"/>
-              <a:t>2016-07-06</a:t>
+              <a:t>2016-07-20</a:t>
             </a:fld>
             <a:endParaRPr lang="ko-KR" altLang="en-US"/>
           </a:p>
@@ -2457,7 +2457,7 @@
           <a:p>
             <a:fld id="{FB30EDBD-1C2D-4C1E-B459-B60219FAB484}" type="datetimeFigureOut">
               <a:rPr lang="ko-KR" altLang="en-US" smtClean="0"/>
-              <a:t>2016-07-06</a:t>
+              <a:t>2016-07-20</a:t>
             </a:fld>
             <a:endParaRPr lang="ko-KR" altLang="en-US"/>
           </a:p>
@@ -2663,7 +2663,7 @@
           <a:p>
             <a:fld id="{FB30EDBD-1C2D-4C1E-B459-B60219FAB484}" type="datetimeFigureOut">
               <a:rPr lang="ko-KR" altLang="en-US" smtClean="0"/>
-              <a:t>2016-07-06</a:t>
+              <a:t>2016-07-20</a:t>
             </a:fld>
             <a:endParaRPr lang="ko-KR" altLang="en-US"/>
           </a:p>
@@ -6911,8 +6911,27 @@
                   </a:schemeClr>
                 </a:solidFill>
               </a:rPr>
-              <a:t>ArrayList&lt;Record&gt; alTable</a:t>
-            </a:r>
+              <a:t>ArrayList&lt;Record&gt; </a:t>
+            </a:r>
+            <a:r>
+              <a:rPr lang="en-US" b="1" dirty="0" err="1">
+                <a:solidFill>
+                  <a:schemeClr val="tx2">
+                    <a:lumMod val="60000"/>
+                    <a:lumOff val="40000"/>
+                  </a:schemeClr>
+                </a:solidFill>
+              </a:rPr>
+              <a:t>alRecord</a:t>
+            </a:r>
+            <a:endParaRPr lang="en-US" b="1" dirty="0">
+              <a:solidFill>
+                <a:schemeClr val="tx2">
+                  <a:lumMod val="60000"/>
+                  <a:lumOff val="40000"/>
+                </a:schemeClr>
+              </a:solidFill>
+            </a:endParaRPr>
           </a:p>
         </p:txBody>
       </p:sp>

</xml_diff>